<commit_message>
third version of the ppt
</commit_message>
<xml_diff>
--- a/ScriptSyncShop.pptx
+++ b/ScriptSyncShop.pptx
@@ -2,22 +2,23 @@
 <file path=ppt/presentation.xml><?xml version="1.0" encoding="utf-8"?>
 <p:presentation xmlns:a="http://schemas.openxmlformats.org/drawingml/2006/main" xmlns:r="http://schemas.openxmlformats.org/officeDocument/2006/relationships" xmlns:p="http://schemas.openxmlformats.org/presentationml/2006/main" saveSubsetFonts="1">
   <p:sldMasterIdLst>
-    <p:sldMasterId id="2147483990" r:id="rId1"/>
+    <p:sldMasterId id="2147484134" r:id="rId1"/>
   </p:sldMasterIdLst>
   <p:notesMasterIdLst>
-    <p:notesMasterId r:id="rId12"/>
+    <p:notesMasterId r:id="rId13"/>
   </p:notesMasterIdLst>
   <p:sldIdLst>
     <p:sldId id="256" r:id="rId2"/>
-    <p:sldId id="258" r:id="rId3"/>
-    <p:sldId id="257" r:id="rId4"/>
-    <p:sldId id="259" r:id="rId5"/>
-    <p:sldId id="260" r:id="rId6"/>
-    <p:sldId id="261" r:id="rId7"/>
-    <p:sldId id="262" r:id="rId8"/>
-    <p:sldId id="263" r:id="rId9"/>
-    <p:sldId id="264" r:id="rId10"/>
-    <p:sldId id="265" r:id="rId11"/>
+    <p:sldId id="266" r:id="rId3"/>
+    <p:sldId id="258" r:id="rId4"/>
+    <p:sldId id="257" r:id="rId5"/>
+    <p:sldId id="259" r:id="rId6"/>
+    <p:sldId id="260" r:id="rId7"/>
+    <p:sldId id="261" r:id="rId8"/>
+    <p:sldId id="262" r:id="rId9"/>
+    <p:sldId id="263" r:id="rId10"/>
+    <p:sldId id="264" r:id="rId11"/>
+    <p:sldId id="265" r:id="rId12"/>
   </p:sldIdLst>
   <p:sldSz cx="12192000" cy="6858000"/>
   <p:notesSz cx="6858000" cy="9144000"/>
@@ -206,7 +207,7 @@
           <a:p>
             <a:fld id="{1E1130B9-D8D8-4471-BC58-5AA66260E364}" type="datetimeFigureOut">
               <a:rPr lang="hu-HU" smtClean="0"/>
-              <a:t>2024. 03. 19.</a:t>
+              <a:t>2024. 03. 21.</a:t>
             </a:fld>
             <a:endParaRPr lang="hu-HU"/>
           </a:p>
@@ -496,7 +497,7 @@
           <p:cNvPr id="2" name="Title 1">
             <a:extLst>
               <a:ext uri="{FF2B5EF4-FFF2-40B4-BE49-F238E27FC236}">
-                <a16:creationId xmlns:a16="http://schemas.microsoft.com/office/drawing/2014/main" id="{F374015C-1F82-5159-927B-7DB0D240C872}"/>
+                <a16:creationId xmlns:a16="http://schemas.microsoft.com/office/drawing/2014/main" id="{67BFB9DE-11E5-3379-C8A8-B9D173538F40}"/>
               </a:ext>
             </a:extLst>
           </p:cNvPr>
@@ -534,7 +535,7 @@
           <p:cNvPr id="3" name="Subtitle 2">
             <a:extLst>
               <a:ext uri="{FF2B5EF4-FFF2-40B4-BE49-F238E27FC236}">
-                <a16:creationId xmlns:a16="http://schemas.microsoft.com/office/drawing/2014/main" id="{ADE0450C-EA74-4534-49DA-B609E9D99304}"/>
+                <a16:creationId xmlns:a16="http://schemas.microsoft.com/office/drawing/2014/main" id="{0A222965-92D0-7AD2-8254-4DE1219A2F28}"/>
               </a:ext>
             </a:extLst>
           </p:cNvPr>
@@ -605,7 +606,7 @@
           <p:cNvPr id="4" name="Date Placeholder 3">
             <a:extLst>
               <a:ext uri="{FF2B5EF4-FFF2-40B4-BE49-F238E27FC236}">
-                <a16:creationId xmlns:a16="http://schemas.microsoft.com/office/drawing/2014/main" id="{7AD2234C-50C8-8C24-9825-D7A123C91EB5}"/>
+                <a16:creationId xmlns:a16="http://schemas.microsoft.com/office/drawing/2014/main" id="{4B95BF56-6650-726A-E542-3B1621A0F862}"/>
               </a:ext>
             </a:extLst>
           </p:cNvPr>
@@ -623,7 +624,7 @@
           <a:p>
             <a:fld id="{523E3A8D-1BBF-408C-BE31-EEFCCA190D99}" type="datetimeFigureOut">
               <a:rPr lang="hu-HU" smtClean="0"/>
-              <a:t>2024. 03. 19.</a:t>
+              <a:t>2024. 03. 21.</a:t>
             </a:fld>
             <a:endParaRPr lang="hu-HU"/>
           </a:p>
@@ -634,7 +635,7 @@
           <p:cNvPr id="5" name="Footer Placeholder 4">
             <a:extLst>
               <a:ext uri="{FF2B5EF4-FFF2-40B4-BE49-F238E27FC236}">
-                <a16:creationId xmlns:a16="http://schemas.microsoft.com/office/drawing/2014/main" id="{59700278-1CE6-A6AD-7B2F-30667923700E}"/>
+                <a16:creationId xmlns:a16="http://schemas.microsoft.com/office/drawing/2014/main" id="{12DD5A2C-5294-DBEF-EC66-3850B96D658C}"/>
               </a:ext>
             </a:extLst>
           </p:cNvPr>
@@ -659,7 +660,7 @@
           <p:cNvPr id="6" name="Slide Number Placeholder 5">
             <a:extLst>
               <a:ext uri="{FF2B5EF4-FFF2-40B4-BE49-F238E27FC236}">
-                <a16:creationId xmlns:a16="http://schemas.microsoft.com/office/drawing/2014/main" id="{CAC3ECFD-5229-78C3-C5DD-80A6C7AB964B}"/>
+                <a16:creationId xmlns:a16="http://schemas.microsoft.com/office/drawing/2014/main" id="{4451001A-3E9F-2205-CE90-91DA47DE767D}"/>
               </a:ext>
             </a:extLst>
           </p:cNvPr>
@@ -686,7 +687,7 @@
     </p:spTree>
     <p:extLst>
       <p:ext uri="{BB962C8B-B14F-4D97-AF65-F5344CB8AC3E}">
-        <p14:creationId xmlns:p14="http://schemas.microsoft.com/office/powerpoint/2010/main" val="719631175"/>
+        <p14:creationId xmlns:p14="http://schemas.microsoft.com/office/powerpoint/2010/main" val="1822821721"/>
       </p:ext>
     </p:extLst>
   </p:cSld>
@@ -718,7 +719,7 @@
           <p:cNvPr id="2" name="Title 1">
             <a:extLst>
               <a:ext uri="{FF2B5EF4-FFF2-40B4-BE49-F238E27FC236}">
-                <a16:creationId xmlns:a16="http://schemas.microsoft.com/office/drawing/2014/main" id="{CDAF8531-5E9C-F592-C9A5-5B89D91E89F9}"/>
+                <a16:creationId xmlns:a16="http://schemas.microsoft.com/office/drawing/2014/main" id="{DA00F611-1B86-2D4A-D417-4F79D2B5659B}"/>
               </a:ext>
             </a:extLst>
           </p:cNvPr>
@@ -747,7 +748,7 @@
           <p:cNvPr id="3" name="Vertical Text Placeholder 2">
             <a:extLst>
               <a:ext uri="{FF2B5EF4-FFF2-40B4-BE49-F238E27FC236}">
-                <a16:creationId xmlns:a16="http://schemas.microsoft.com/office/drawing/2014/main" id="{66D79417-5749-3381-ECD5-5CB9A4376B76}"/>
+                <a16:creationId xmlns:a16="http://schemas.microsoft.com/office/drawing/2014/main" id="{BCBCDEA9-B6BF-2083-CD21-01FBD1DAFE69}"/>
               </a:ext>
             </a:extLst>
           </p:cNvPr>
@@ -805,7 +806,7 @@
           <p:cNvPr id="4" name="Date Placeholder 3">
             <a:extLst>
               <a:ext uri="{FF2B5EF4-FFF2-40B4-BE49-F238E27FC236}">
-                <a16:creationId xmlns:a16="http://schemas.microsoft.com/office/drawing/2014/main" id="{46367770-5767-27C1-6E78-F9DF8381079E}"/>
+                <a16:creationId xmlns:a16="http://schemas.microsoft.com/office/drawing/2014/main" id="{E5181EC1-5ED3-8FBC-937E-8420D37DF2BE}"/>
               </a:ext>
             </a:extLst>
           </p:cNvPr>
@@ -823,7 +824,7 @@
           <a:p>
             <a:fld id="{523E3A8D-1BBF-408C-BE31-EEFCCA190D99}" type="datetimeFigureOut">
               <a:rPr lang="hu-HU" smtClean="0"/>
-              <a:t>2024. 03. 19.</a:t>
+              <a:t>2024. 03. 21.</a:t>
             </a:fld>
             <a:endParaRPr lang="hu-HU"/>
           </a:p>
@@ -834,7 +835,7 @@
           <p:cNvPr id="5" name="Footer Placeholder 4">
             <a:extLst>
               <a:ext uri="{FF2B5EF4-FFF2-40B4-BE49-F238E27FC236}">
-                <a16:creationId xmlns:a16="http://schemas.microsoft.com/office/drawing/2014/main" id="{39485D9C-1DD3-922F-6D24-17C977BD9B7A}"/>
+                <a16:creationId xmlns:a16="http://schemas.microsoft.com/office/drawing/2014/main" id="{DBECD2D2-ED43-C035-168D-F594D446DBF7}"/>
               </a:ext>
             </a:extLst>
           </p:cNvPr>
@@ -859,7 +860,7 @@
           <p:cNvPr id="6" name="Slide Number Placeholder 5">
             <a:extLst>
               <a:ext uri="{FF2B5EF4-FFF2-40B4-BE49-F238E27FC236}">
-                <a16:creationId xmlns:a16="http://schemas.microsoft.com/office/drawing/2014/main" id="{5D8B3F1C-9C0E-D959-A122-8024C09EC799}"/>
+                <a16:creationId xmlns:a16="http://schemas.microsoft.com/office/drawing/2014/main" id="{C028E361-B96F-0897-348D-F0ECEF3ADB50}"/>
               </a:ext>
             </a:extLst>
           </p:cNvPr>
@@ -886,7 +887,7 @@
     </p:spTree>
     <p:extLst>
       <p:ext uri="{BB962C8B-B14F-4D97-AF65-F5344CB8AC3E}">
-        <p14:creationId xmlns:p14="http://schemas.microsoft.com/office/powerpoint/2010/main" val="1665134044"/>
+        <p14:creationId xmlns:p14="http://schemas.microsoft.com/office/powerpoint/2010/main" val="3330485569"/>
       </p:ext>
     </p:extLst>
   </p:cSld>
@@ -918,7 +919,7 @@
           <p:cNvPr id="2" name="Vertical Title 1">
             <a:extLst>
               <a:ext uri="{FF2B5EF4-FFF2-40B4-BE49-F238E27FC236}">
-                <a16:creationId xmlns:a16="http://schemas.microsoft.com/office/drawing/2014/main" id="{B407AD7D-53BC-2D7A-EEC2-78557785B708}"/>
+                <a16:creationId xmlns:a16="http://schemas.microsoft.com/office/drawing/2014/main" id="{5CCF9FA4-A75C-D591-5BF4-4AAE87B7361D}"/>
               </a:ext>
             </a:extLst>
           </p:cNvPr>
@@ -952,7 +953,7 @@
           <p:cNvPr id="3" name="Vertical Text Placeholder 2">
             <a:extLst>
               <a:ext uri="{FF2B5EF4-FFF2-40B4-BE49-F238E27FC236}">
-                <a16:creationId xmlns:a16="http://schemas.microsoft.com/office/drawing/2014/main" id="{1595B893-F0A0-7F63-FFDF-3CE484B5A9B0}"/>
+                <a16:creationId xmlns:a16="http://schemas.microsoft.com/office/drawing/2014/main" id="{32E719F9-B1AA-4F06-AFF5-22CA6049E414}"/>
               </a:ext>
             </a:extLst>
           </p:cNvPr>
@@ -1015,7 +1016,7 @@
           <p:cNvPr id="4" name="Date Placeholder 3">
             <a:extLst>
               <a:ext uri="{FF2B5EF4-FFF2-40B4-BE49-F238E27FC236}">
-                <a16:creationId xmlns:a16="http://schemas.microsoft.com/office/drawing/2014/main" id="{3D8200DC-5587-D770-A8F4-FAA7B6A58345}"/>
+                <a16:creationId xmlns:a16="http://schemas.microsoft.com/office/drawing/2014/main" id="{B1EBDDFC-16A8-40B4-582A-E9F9BC6D2FD8}"/>
               </a:ext>
             </a:extLst>
           </p:cNvPr>
@@ -1033,7 +1034,7 @@
           <a:p>
             <a:fld id="{523E3A8D-1BBF-408C-BE31-EEFCCA190D99}" type="datetimeFigureOut">
               <a:rPr lang="hu-HU" smtClean="0"/>
-              <a:t>2024. 03. 19.</a:t>
+              <a:t>2024. 03. 21.</a:t>
             </a:fld>
             <a:endParaRPr lang="hu-HU"/>
           </a:p>
@@ -1044,7 +1045,7 @@
           <p:cNvPr id="5" name="Footer Placeholder 4">
             <a:extLst>
               <a:ext uri="{FF2B5EF4-FFF2-40B4-BE49-F238E27FC236}">
-                <a16:creationId xmlns:a16="http://schemas.microsoft.com/office/drawing/2014/main" id="{C6788850-FAD4-AED9-40FB-DA5757BD5D26}"/>
+                <a16:creationId xmlns:a16="http://schemas.microsoft.com/office/drawing/2014/main" id="{EB362310-6D48-1DEC-904B-9D43CACC85FF}"/>
               </a:ext>
             </a:extLst>
           </p:cNvPr>
@@ -1069,7 +1070,7 @@
           <p:cNvPr id="6" name="Slide Number Placeholder 5">
             <a:extLst>
               <a:ext uri="{FF2B5EF4-FFF2-40B4-BE49-F238E27FC236}">
-                <a16:creationId xmlns:a16="http://schemas.microsoft.com/office/drawing/2014/main" id="{46691141-9FFB-6453-A901-D30A377DCBA8}"/>
+                <a16:creationId xmlns:a16="http://schemas.microsoft.com/office/drawing/2014/main" id="{A0494B34-6FB7-22F6-66FF-D5AD908B28DB}"/>
               </a:ext>
             </a:extLst>
           </p:cNvPr>
@@ -1096,7 +1097,7 @@
     </p:spTree>
     <p:extLst>
       <p:ext uri="{BB962C8B-B14F-4D97-AF65-F5344CB8AC3E}">
-        <p14:creationId xmlns:p14="http://schemas.microsoft.com/office/powerpoint/2010/main" val="3763857095"/>
+        <p14:creationId xmlns:p14="http://schemas.microsoft.com/office/powerpoint/2010/main" val="238546731"/>
       </p:ext>
     </p:extLst>
   </p:cSld>
@@ -1128,7 +1129,7 @@
           <p:cNvPr id="2" name="Title 1">
             <a:extLst>
               <a:ext uri="{FF2B5EF4-FFF2-40B4-BE49-F238E27FC236}">
-                <a16:creationId xmlns:a16="http://schemas.microsoft.com/office/drawing/2014/main" id="{D2A5C836-5B82-86E8-DB9D-F6E1902F2890}"/>
+                <a16:creationId xmlns:a16="http://schemas.microsoft.com/office/drawing/2014/main" id="{ECC1E530-4929-FBDC-63B4-0C2AB6544518}"/>
               </a:ext>
             </a:extLst>
           </p:cNvPr>
@@ -1157,7 +1158,7 @@
           <p:cNvPr id="3" name="Content Placeholder 2">
             <a:extLst>
               <a:ext uri="{FF2B5EF4-FFF2-40B4-BE49-F238E27FC236}">
-                <a16:creationId xmlns:a16="http://schemas.microsoft.com/office/drawing/2014/main" id="{71BA5EAE-23BE-91E9-2215-55767B08764C}"/>
+                <a16:creationId xmlns:a16="http://schemas.microsoft.com/office/drawing/2014/main" id="{1188304E-D74A-13C5-9494-7C41F7B1B7A9}"/>
               </a:ext>
             </a:extLst>
           </p:cNvPr>
@@ -1215,7 +1216,7 @@
           <p:cNvPr id="4" name="Date Placeholder 3">
             <a:extLst>
               <a:ext uri="{FF2B5EF4-FFF2-40B4-BE49-F238E27FC236}">
-                <a16:creationId xmlns:a16="http://schemas.microsoft.com/office/drawing/2014/main" id="{4FAF4F16-09A6-A34C-4AE1-C03EDAE98C50}"/>
+                <a16:creationId xmlns:a16="http://schemas.microsoft.com/office/drawing/2014/main" id="{7375F014-DB35-86F5-46A8-55710F68926E}"/>
               </a:ext>
             </a:extLst>
           </p:cNvPr>
@@ -1233,7 +1234,7 @@
           <a:p>
             <a:fld id="{523E3A8D-1BBF-408C-BE31-EEFCCA190D99}" type="datetimeFigureOut">
               <a:rPr lang="hu-HU" smtClean="0"/>
-              <a:t>2024. 03. 19.</a:t>
+              <a:t>2024. 03. 21.</a:t>
             </a:fld>
             <a:endParaRPr lang="hu-HU"/>
           </a:p>
@@ -1244,7 +1245,7 @@
           <p:cNvPr id="5" name="Footer Placeholder 4">
             <a:extLst>
               <a:ext uri="{FF2B5EF4-FFF2-40B4-BE49-F238E27FC236}">
-                <a16:creationId xmlns:a16="http://schemas.microsoft.com/office/drawing/2014/main" id="{9F1FDCE4-3E70-8A2B-6C44-D803B514D840}"/>
+                <a16:creationId xmlns:a16="http://schemas.microsoft.com/office/drawing/2014/main" id="{A9A5B9AE-8F93-CEC1-6B26-0611A9E6799D}"/>
               </a:ext>
             </a:extLst>
           </p:cNvPr>
@@ -1269,7 +1270,7 @@
           <p:cNvPr id="6" name="Slide Number Placeholder 5">
             <a:extLst>
               <a:ext uri="{FF2B5EF4-FFF2-40B4-BE49-F238E27FC236}">
-                <a16:creationId xmlns:a16="http://schemas.microsoft.com/office/drawing/2014/main" id="{7B8C9B97-97C3-3BF2-679D-015349048D69}"/>
+                <a16:creationId xmlns:a16="http://schemas.microsoft.com/office/drawing/2014/main" id="{5B54CFB4-19B2-D087-CBF2-882F51B07E3E}"/>
               </a:ext>
             </a:extLst>
           </p:cNvPr>
@@ -1296,7 +1297,7 @@
     </p:spTree>
     <p:extLst>
       <p:ext uri="{BB962C8B-B14F-4D97-AF65-F5344CB8AC3E}">
-        <p14:creationId xmlns:p14="http://schemas.microsoft.com/office/powerpoint/2010/main" val="1980760126"/>
+        <p14:creationId xmlns:p14="http://schemas.microsoft.com/office/powerpoint/2010/main" val="3506761736"/>
       </p:ext>
     </p:extLst>
   </p:cSld>
@@ -1328,7 +1329,7 @@
           <p:cNvPr id="2" name="Title 1">
             <a:extLst>
               <a:ext uri="{FF2B5EF4-FFF2-40B4-BE49-F238E27FC236}">
-                <a16:creationId xmlns:a16="http://schemas.microsoft.com/office/drawing/2014/main" id="{D593FE1B-F22C-7303-7970-0E674C0D623A}"/>
+                <a16:creationId xmlns:a16="http://schemas.microsoft.com/office/drawing/2014/main" id="{1DDE9159-662D-0934-88F8-9D6577468199}"/>
               </a:ext>
             </a:extLst>
           </p:cNvPr>
@@ -1366,7 +1367,7 @@
           <p:cNvPr id="3" name="Text Placeholder 2">
             <a:extLst>
               <a:ext uri="{FF2B5EF4-FFF2-40B4-BE49-F238E27FC236}">
-                <a16:creationId xmlns:a16="http://schemas.microsoft.com/office/drawing/2014/main" id="{45E4968A-702F-4B8A-97D7-95F041BB4460}"/>
+                <a16:creationId xmlns:a16="http://schemas.microsoft.com/office/drawing/2014/main" id="{257D62DB-F4F5-FAA9-9298-2B8B19974C24}"/>
               </a:ext>
             </a:extLst>
           </p:cNvPr>
@@ -1391,7 +1392,7 @@
               <a:defRPr sz="2400">
                 <a:solidFill>
                   <a:schemeClr val="tx1">
-                    <a:tint val="75000"/>
+                    <a:tint val="82000"/>
                   </a:schemeClr>
                 </a:solidFill>
               </a:defRPr>
@@ -1401,7 +1402,7 @@
               <a:defRPr sz="2000">
                 <a:solidFill>
                   <a:schemeClr val="tx1">
-                    <a:tint val="75000"/>
+                    <a:tint val="82000"/>
                   </a:schemeClr>
                 </a:solidFill>
               </a:defRPr>
@@ -1411,7 +1412,7 @@
               <a:defRPr sz="1800">
                 <a:solidFill>
                   <a:schemeClr val="tx1">
-                    <a:tint val="75000"/>
+                    <a:tint val="82000"/>
                   </a:schemeClr>
                 </a:solidFill>
               </a:defRPr>
@@ -1421,7 +1422,7 @@
               <a:defRPr sz="1600">
                 <a:solidFill>
                   <a:schemeClr val="tx1">
-                    <a:tint val="75000"/>
+                    <a:tint val="82000"/>
                   </a:schemeClr>
                 </a:solidFill>
               </a:defRPr>
@@ -1431,7 +1432,7 @@
               <a:defRPr sz="1600">
                 <a:solidFill>
                   <a:schemeClr val="tx1">
-                    <a:tint val="75000"/>
+                    <a:tint val="82000"/>
                   </a:schemeClr>
                 </a:solidFill>
               </a:defRPr>
@@ -1441,7 +1442,7 @@
               <a:defRPr sz="1600">
                 <a:solidFill>
                   <a:schemeClr val="tx1">
-                    <a:tint val="75000"/>
+                    <a:tint val="82000"/>
                   </a:schemeClr>
                 </a:solidFill>
               </a:defRPr>
@@ -1451,7 +1452,7 @@
               <a:defRPr sz="1600">
                 <a:solidFill>
                   <a:schemeClr val="tx1">
-                    <a:tint val="75000"/>
+                    <a:tint val="82000"/>
                   </a:schemeClr>
                 </a:solidFill>
               </a:defRPr>
@@ -1461,7 +1462,7 @@
               <a:defRPr sz="1600">
                 <a:solidFill>
                   <a:schemeClr val="tx1">
-                    <a:tint val="75000"/>
+                    <a:tint val="82000"/>
                   </a:schemeClr>
                 </a:solidFill>
               </a:defRPr>
@@ -1471,7 +1472,7 @@
               <a:defRPr sz="1600">
                 <a:solidFill>
                   <a:schemeClr val="tx1">
-                    <a:tint val="75000"/>
+                    <a:tint val="82000"/>
                   </a:schemeClr>
                 </a:solidFill>
               </a:defRPr>
@@ -1491,7 +1492,7 @@
           <p:cNvPr id="4" name="Date Placeholder 3">
             <a:extLst>
               <a:ext uri="{FF2B5EF4-FFF2-40B4-BE49-F238E27FC236}">
-                <a16:creationId xmlns:a16="http://schemas.microsoft.com/office/drawing/2014/main" id="{09E333F0-2B62-65FD-6DEB-C65300AF2B61}"/>
+                <a16:creationId xmlns:a16="http://schemas.microsoft.com/office/drawing/2014/main" id="{52BDF347-822C-050E-59FF-8B8998D6AFCA}"/>
               </a:ext>
             </a:extLst>
           </p:cNvPr>
@@ -1509,7 +1510,7 @@
           <a:p>
             <a:fld id="{523E3A8D-1BBF-408C-BE31-EEFCCA190D99}" type="datetimeFigureOut">
               <a:rPr lang="hu-HU" smtClean="0"/>
-              <a:t>2024. 03. 19.</a:t>
+              <a:t>2024. 03. 21.</a:t>
             </a:fld>
             <a:endParaRPr lang="hu-HU"/>
           </a:p>
@@ -1520,7 +1521,7 @@
           <p:cNvPr id="5" name="Footer Placeholder 4">
             <a:extLst>
               <a:ext uri="{FF2B5EF4-FFF2-40B4-BE49-F238E27FC236}">
-                <a16:creationId xmlns:a16="http://schemas.microsoft.com/office/drawing/2014/main" id="{AEF0FE90-8B57-2A80-FF0B-8CF9CF610BA3}"/>
+                <a16:creationId xmlns:a16="http://schemas.microsoft.com/office/drawing/2014/main" id="{1DB6AD1F-E351-B635-008C-962FD6B94425}"/>
               </a:ext>
             </a:extLst>
           </p:cNvPr>
@@ -1545,7 +1546,7 @@
           <p:cNvPr id="6" name="Slide Number Placeholder 5">
             <a:extLst>
               <a:ext uri="{FF2B5EF4-FFF2-40B4-BE49-F238E27FC236}">
-                <a16:creationId xmlns:a16="http://schemas.microsoft.com/office/drawing/2014/main" id="{433DFCAD-2881-D50C-181F-F4EB8442C009}"/>
+                <a16:creationId xmlns:a16="http://schemas.microsoft.com/office/drawing/2014/main" id="{4B2B78F4-6431-E4B0-DB96-24A2215D818B}"/>
               </a:ext>
             </a:extLst>
           </p:cNvPr>
@@ -1572,7 +1573,7 @@
     </p:spTree>
     <p:extLst>
       <p:ext uri="{BB962C8B-B14F-4D97-AF65-F5344CB8AC3E}">
-        <p14:creationId xmlns:p14="http://schemas.microsoft.com/office/powerpoint/2010/main" val="222814888"/>
+        <p14:creationId xmlns:p14="http://schemas.microsoft.com/office/powerpoint/2010/main" val="2441675917"/>
       </p:ext>
     </p:extLst>
   </p:cSld>
@@ -1604,7 +1605,7 @@
           <p:cNvPr id="2" name="Title 1">
             <a:extLst>
               <a:ext uri="{FF2B5EF4-FFF2-40B4-BE49-F238E27FC236}">
-                <a16:creationId xmlns:a16="http://schemas.microsoft.com/office/drawing/2014/main" id="{DFB410B3-68B7-D9D3-0DFB-697EC77B6B6E}"/>
+                <a16:creationId xmlns:a16="http://schemas.microsoft.com/office/drawing/2014/main" id="{693411C7-6934-0FAF-0965-9A1AE169FEB3}"/>
               </a:ext>
             </a:extLst>
           </p:cNvPr>
@@ -1633,7 +1634,7 @@
           <p:cNvPr id="3" name="Content Placeholder 2">
             <a:extLst>
               <a:ext uri="{FF2B5EF4-FFF2-40B4-BE49-F238E27FC236}">
-                <a16:creationId xmlns:a16="http://schemas.microsoft.com/office/drawing/2014/main" id="{AB6B0EDD-F057-0FAD-AA53-7392DE33DB87}"/>
+                <a16:creationId xmlns:a16="http://schemas.microsoft.com/office/drawing/2014/main" id="{79AE8359-D437-EB69-C684-83B25799017C}"/>
               </a:ext>
             </a:extLst>
           </p:cNvPr>
@@ -1696,7 +1697,7 @@
           <p:cNvPr id="4" name="Content Placeholder 3">
             <a:extLst>
               <a:ext uri="{FF2B5EF4-FFF2-40B4-BE49-F238E27FC236}">
-                <a16:creationId xmlns:a16="http://schemas.microsoft.com/office/drawing/2014/main" id="{D7F8790F-195B-F016-5D30-DBF92E2DB802}"/>
+                <a16:creationId xmlns:a16="http://schemas.microsoft.com/office/drawing/2014/main" id="{0F255E87-799C-D52A-7C7C-AF91BFB6C311}"/>
               </a:ext>
             </a:extLst>
           </p:cNvPr>
@@ -1759,7 +1760,7 @@
           <p:cNvPr id="5" name="Date Placeholder 4">
             <a:extLst>
               <a:ext uri="{FF2B5EF4-FFF2-40B4-BE49-F238E27FC236}">
-                <a16:creationId xmlns:a16="http://schemas.microsoft.com/office/drawing/2014/main" id="{073285B7-B676-D22C-46C5-D95B73D7642B}"/>
+                <a16:creationId xmlns:a16="http://schemas.microsoft.com/office/drawing/2014/main" id="{683F0694-55E0-D007-49FE-A565A302FB72}"/>
               </a:ext>
             </a:extLst>
           </p:cNvPr>
@@ -1777,7 +1778,7 @@
           <a:p>
             <a:fld id="{523E3A8D-1BBF-408C-BE31-EEFCCA190D99}" type="datetimeFigureOut">
               <a:rPr lang="hu-HU" smtClean="0"/>
-              <a:t>2024. 03. 19.</a:t>
+              <a:t>2024. 03. 21.</a:t>
             </a:fld>
             <a:endParaRPr lang="hu-HU"/>
           </a:p>
@@ -1788,7 +1789,7 @@
           <p:cNvPr id="6" name="Footer Placeholder 5">
             <a:extLst>
               <a:ext uri="{FF2B5EF4-FFF2-40B4-BE49-F238E27FC236}">
-                <a16:creationId xmlns:a16="http://schemas.microsoft.com/office/drawing/2014/main" id="{58A97612-2649-46C8-E0B5-56B6955525AD}"/>
+                <a16:creationId xmlns:a16="http://schemas.microsoft.com/office/drawing/2014/main" id="{07B46785-8293-16BC-5224-4EFC96ACF814}"/>
               </a:ext>
             </a:extLst>
           </p:cNvPr>
@@ -1813,7 +1814,7 @@
           <p:cNvPr id="7" name="Slide Number Placeholder 6">
             <a:extLst>
               <a:ext uri="{FF2B5EF4-FFF2-40B4-BE49-F238E27FC236}">
-                <a16:creationId xmlns:a16="http://schemas.microsoft.com/office/drawing/2014/main" id="{5805338F-7A1A-FDFD-1D49-6559A0DA1AFA}"/>
+                <a16:creationId xmlns:a16="http://schemas.microsoft.com/office/drawing/2014/main" id="{DA3B0200-C991-92AB-9FE6-ACE28F5583EE}"/>
               </a:ext>
             </a:extLst>
           </p:cNvPr>
@@ -1840,7 +1841,7 @@
     </p:spTree>
     <p:extLst>
       <p:ext uri="{BB962C8B-B14F-4D97-AF65-F5344CB8AC3E}">
-        <p14:creationId xmlns:p14="http://schemas.microsoft.com/office/powerpoint/2010/main" val="68755071"/>
+        <p14:creationId xmlns:p14="http://schemas.microsoft.com/office/powerpoint/2010/main" val="2445174471"/>
       </p:ext>
     </p:extLst>
   </p:cSld>
@@ -1872,7 +1873,7 @@
           <p:cNvPr id="2" name="Title 1">
             <a:extLst>
               <a:ext uri="{FF2B5EF4-FFF2-40B4-BE49-F238E27FC236}">
-                <a16:creationId xmlns:a16="http://schemas.microsoft.com/office/drawing/2014/main" id="{3888D437-23C7-6C3D-BEFF-1CCA1F5CE71D}"/>
+                <a16:creationId xmlns:a16="http://schemas.microsoft.com/office/drawing/2014/main" id="{C88F9BDB-4E13-D707-3394-115D185FF402}"/>
               </a:ext>
             </a:extLst>
           </p:cNvPr>
@@ -1906,7 +1907,7 @@
           <p:cNvPr id="3" name="Text Placeholder 2">
             <a:extLst>
               <a:ext uri="{FF2B5EF4-FFF2-40B4-BE49-F238E27FC236}">
-                <a16:creationId xmlns:a16="http://schemas.microsoft.com/office/drawing/2014/main" id="{882449CC-E5E5-DD68-BE7A-1B5432EE2297}"/>
+                <a16:creationId xmlns:a16="http://schemas.microsoft.com/office/drawing/2014/main" id="{ADE7A751-DA58-6ACE-FECD-E113F4B8AEB8}"/>
               </a:ext>
             </a:extLst>
           </p:cNvPr>
@@ -1977,7 +1978,7 @@
           <p:cNvPr id="4" name="Content Placeholder 3">
             <a:extLst>
               <a:ext uri="{FF2B5EF4-FFF2-40B4-BE49-F238E27FC236}">
-                <a16:creationId xmlns:a16="http://schemas.microsoft.com/office/drawing/2014/main" id="{F811329E-B3C0-344B-3D69-92C40E955458}"/>
+                <a16:creationId xmlns:a16="http://schemas.microsoft.com/office/drawing/2014/main" id="{15926DE1-EBB4-D37D-C60B-60AA088F078D}"/>
               </a:ext>
             </a:extLst>
           </p:cNvPr>
@@ -2040,7 +2041,7 @@
           <p:cNvPr id="5" name="Text Placeholder 4">
             <a:extLst>
               <a:ext uri="{FF2B5EF4-FFF2-40B4-BE49-F238E27FC236}">
-                <a16:creationId xmlns:a16="http://schemas.microsoft.com/office/drawing/2014/main" id="{10C6B0F8-1383-5F3F-6890-459D53C64A51}"/>
+                <a16:creationId xmlns:a16="http://schemas.microsoft.com/office/drawing/2014/main" id="{4B029639-792E-58D0-FF01-01A0E42C4893}"/>
               </a:ext>
             </a:extLst>
           </p:cNvPr>
@@ -2111,7 +2112,7 @@
           <p:cNvPr id="6" name="Content Placeholder 5">
             <a:extLst>
               <a:ext uri="{FF2B5EF4-FFF2-40B4-BE49-F238E27FC236}">
-                <a16:creationId xmlns:a16="http://schemas.microsoft.com/office/drawing/2014/main" id="{FF05AD70-D3F8-3A01-7EDA-80DA29DC61A3}"/>
+                <a16:creationId xmlns:a16="http://schemas.microsoft.com/office/drawing/2014/main" id="{A64E41D4-50D1-090B-3A8B-1DEC90ECB629}"/>
               </a:ext>
             </a:extLst>
           </p:cNvPr>
@@ -2174,7 +2175,7 @@
           <p:cNvPr id="7" name="Date Placeholder 6">
             <a:extLst>
               <a:ext uri="{FF2B5EF4-FFF2-40B4-BE49-F238E27FC236}">
-                <a16:creationId xmlns:a16="http://schemas.microsoft.com/office/drawing/2014/main" id="{6E6337D7-4A72-2B1C-DC7C-7C874854BBC4}"/>
+                <a16:creationId xmlns:a16="http://schemas.microsoft.com/office/drawing/2014/main" id="{34C125D8-30AE-14BF-26E0-A98078AB20D1}"/>
               </a:ext>
             </a:extLst>
           </p:cNvPr>
@@ -2192,7 +2193,7 @@
           <a:p>
             <a:fld id="{523E3A8D-1BBF-408C-BE31-EEFCCA190D99}" type="datetimeFigureOut">
               <a:rPr lang="hu-HU" smtClean="0"/>
-              <a:t>2024. 03. 19.</a:t>
+              <a:t>2024. 03. 21.</a:t>
             </a:fld>
             <a:endParaRPr lang="hu-HU"/>
           </a:p>
@@ -2203,7 +2204,7 @@
           <p:cNvPr id="8" name="Footer Placeholder 7">
             <a:extLst>
               <a:ext uri="{FF2B5EF4-FFF2-40B4-BE49-F238E27FC236}">
-                <a16:creationId xmlns:a16="http://schemas.microsoft.com/office/drawing/2014/main" id="{9EE40A2D-0038-019B-98B3-C5E3555140B9}"/>
+                <a16:creationId xmlns:a16="http://schemas.microsoft.com/office/drawing/2014/main" id="{2674D9E3-6C0F-B7DF-9411-16F3A832332D}"/>
               </a:ext>
             </a:extLst>
           </p:cNvPr>
@@ -2228,7 +2229,7 @@
           <p:cNvPr id="9" name="Slide Number Placeholder 8">
             <a:extLst>
               <a:ext uri="{FF2B5EF4-FFF2-40B4-BE49-F238E27FC236}">
-                <a16:creationId xmlns:a16="http://schemas.microsoft.com/office/drawing/2014/main" id="{359A3064-9CDB-3199-C54D-BFAF4AFBF75D}"/>
+                <a16:creationId xmlns:a16="http://schemas.microsoft.com/office/drawing/2014/main" id="{010F9111-71AF-2808-4602-06416CA78826}"/>
               </a:ext>
             </a:extLst>
           </p:cNvPr>
@@ -2255,7 +2256,7 @@
     </p:spTree>
     <p:extLst>
       <p:ext uri="{BB962C8B-B14F-4D97-AF65-F5344CB8AC3E}">
-        <p14:creationId xmlns:p14="http://schemas.microsoft.com/office/powerpoint/2010/main" val="2586627777"/>
+        <p14:creationId xmlns:p14="http://schemas.microsoft.com/office/powerpoint/2010/main" val="649033840"/>
       </p:ext>
     </p:extLst>
   </p:cSld>
@@ -2287,7 +2288,7 @@
           <p:cNvPr id="2" name="Title 1">
             <a:extLst>
               <a:ext uri="{FF2B5EF4-FFF2-40B4-BE49-F238E27FC236}">
-                <a16:creationId xmlns:a16="http://schemas.microsoft.com/office/drawing/2014/main" id="{F6D00D7A-DFD1-F161-CBA8-B4D6BF1E1217}"/>
+                <a16:creationId xmlns:a16="http://schemas.microsoft.com/office/drawing/2014/main" id="{2B48C59C-5624-2F3E-BEB5-11DD4FD42C75}"/>
               </a:ext>
             </a:extLst>
           </p:cNvPr>
@@ -2316,7 +2317,7 @@
           <p:cNvPr id="3" name="Date Placeholder 2">
             <a:extLst>
               <a:ext uri="{FF2B5EF4-FFF2-40B4-BE49-F238E27FC236}">
-                <a16:creationId xmlns:a16="http://schemas.microsoft.com/office/drawing/2014/main" id="{4E0EF004-0C18-C652-E843-D3D6E97C3371}"/>
+                <a16:creationId xmlns:a16="http://schemas.microsoft.com/office/drawing/2014/main" id="{4D748604-82DE-FCD5-C3C0-764FF9A81464}"/>
               </a:ext>
             </a:extLst>
           </p:cNvPr>
@@ -2334,7 +2335,7 @@
           <a:p>
             <a:fld id="{523E3A8D-1BBF-408C-BE31-EEFCCA190D99}" type="datetimeFigureOut">
               <a:rPr lang="hu-HU" smtClean="0"/>
-              <a:t>2024. 03. 19.</a:t>
+              <a:t>2024. 03. 21.</a:t>
             </a:fld>
             <a:endParaRPr lang="hu-HU"/>
           </a:p>
@@ -2345,7 +2346,7 @@
           <p:cNvPr id="4" name="Footer Placeholder 3">
             <a:extLst>
               <a:ext uri="{FF2B5EF4-FFF2-40B4-BE49-F238E27FC236}">
-                <a16:creationId xmlns:a16="http://schemas.microsoft.com/office/drawing/2014/main" id="{7AE67FBC-E883-27CE-2E86-9A4A715704C6}"/>
+                <a16:creationId xmlns:a16="http://schemas.microsoft.com/office/drawing/2014/main" id="{020984EB-8527-E717-D6B8-8A88739211A3}"/>
               </a:ext>
             </a:extLst>
           </p:cNvPr>
@@ -2370,7 +2371,7 @@
           <p:cNvPr id="5" name="Slide Number Placeholder 4">
             <a:extLst>
               <a:ext uri="{FF2B5EF4-FFF2-40B4-BE49-F238E27FC236}">
-                <a16:creationId xmlns:a16="http://schemas.microsoft.com/office/drawing/2014/main" id="{5EEFE78B-67F5-6F92-968E-C2FFD7CD2887}"/>
+                <a16:creationId xmlns:a16="http://schemas.microsoft.com/office/drawing/2014/main" id="{318CACF7-587C-61DB-6370-C8FAD2502A46}"/>
               </a:ext>
             </a:extLst>
           </p:cNvPr>
@@ -2397,7 +2398,7 @@
     </p:spTree>
     <p:extLst>
       <p:ext uri="{BB962C8B-B14F-4D97-AF65-F5344CB8AC3E}">
-        <p14:creationId xmlns:p14="http://schemas.microsoft.com/office/powerpoint/2010/main" val="3146186148"/>
+        <p14:creationId xmlns:p14="http://schemas.microsoft.com/office/powerpoint/2010/main" val="3017093202"/>
       </p:ext>
     </p:extLst>
   </p:cSld>
@@ -2429,7 +2430,7 @@
           <p:cNvPr id="2" name="Date Placeholder 1">
             <a:extLst>
               <a:ext uri="{FF2B5EF4-FFF2-40B4-BE49-F238E27FC236}">
-                <a16:creationId xmlns:a16="http://schemas.microsoft.com/office/drawing/2014/main" id="{E9A49EB1-D234-8211-CBAD-D967A0CA6BA1}"/>
+                <a16:creationId xmlns:a16="http://schemas.microsoft.com/office/drawing/2014/main" id="{16605DE3-426E-9262-E310-ACA4C1F8FF72}"/>
               </a:ext>
             </a:extLst>
           </p:cNvPr>
@@ -2447,7 +2448,7 @@
           <a:p>
             <a:fld id="{523E3A8D-1BBF-408C-BE31-EEFCCA190D99}" type="datetimeFigureOut">
               <a:rPr lang="hu-HU" smtClean="0"/>
-              <a:t>2024. 03. 19.</a:t>
+              <a:t>2024. 03. 21.</a:t>
             </a:fld>
             <a:endParaRPr lang="hu-HU"/>
           </a:p>
@@ -2458,7 +2459,7 @@
           <p:cNvPr id="3" name="Footer Placeholder 2">
             <a:extLst>
               <a:ext uri="{FF2B5EF4-FFF2-40B4-BE49-F238E27FC236}">
-                <a16:creationId xmlns:a16="http://schemas.microsoft.com/office/drawing/2014/main" id="{3502A39F-240B-509E-8397-67E034F65E80}"/>
+                <a16:creationId xmlns:a16="http://schemas.microsoft.com/office/drawing/2014/main" id="{E2198965-76D7-77EC-D312-60E053DFE04B}"/>
               </a:ext>
             </a:extLst>
           </p:cNvPr>
@@ -2483,7 +2484,7 @@
           <p:cNvPr id="4" name="Slide Number Placeholder 3">
             <a:extLst>
               <a:ext uri="{FF2B5EF4-FFF2-40B4-BE49-F238E27FC236}">
-                <a16:creationId xmlns:a16="http://schemas.microsoft.com/office/drawing/2014/main" id="{EDB11493-19C6-EE69-9BF4-485438B79C06}"/>
+                <a16:creationId xmlns:a16="http://schemas.microsoft.com/office/drawing/2014/main" id="{CE333E42-4BDF-5743-068E-3658572EEF52}"/>
               </a:ext>
             </a:extLst>
           </p:cNvPr>
@@ -2510,7 +2511,7 @@
     </p:spTree>
     <p:extLst>
       <p:ext uri="{BB962C8B-B14F-4D97-AF65-F5344CB8AC3E}">
-        <p14:creationId xmlns:p14="http://schemas.microsoft.com/office/powerpoint/2010/main" val="1078734633"/>
+        <p14:creationId xmlns:p14="http://schemas.microsoft.com/office/powerpoint/2010/main" val="4007534324"/>
       </p:ext>
     </p:extLst>
   </p:cSld>
@@ -2542,7 +2543,7 @@
           <p:cNvPr id="2" name="Title 1">
             <a:extLst>
               <a:ext uri="{FF2B5EF4-FFF2-40B4-BE49-F238E27FC236}">
-                <a16:creationId xmlns:a16="http://schemas.microsoft.com/office/drawing/2014/main" id="{911E948A-625C-EAF6-F0DF-EB1C15602973}"/>
+                <a16:creationId xmlns:a16="http://schemas.microsoft.com/office/drawing/2014/main" id="{3546EE94-487B-CE28-1472-D79B4E1B6E7A}"/>
               </a:ext>
             </a:extLst>
           </p:cNvPr>
@@ -2580,7 +2581,7 @@
           <p:cNvPr id="3" name="Content Placeholder 2">
             <a:extLst>
               <a:ext uri="{FF2B5EF4-FFF2-40B4-BE49-F238E27FC236}">
-                <a16:creationId xmlns:a16="http://schemas.microsoft.com/office/drawing/2014/main" id="{14BEA584-C131-285C-71CB-A32CC3FC123A}"/>
+                <a16:creationId xmlns:a16="http://schemas.microsoft.com/office/drawing/2014/main" id="{77EE5320-B3DF-785B-A510-0D28900E1B31}"/>
               </a:ext>
             </a:extLst>
           </p:cNvPr>
@@ -2671,7 +2672,7 @@
           <p:cNvPr id="4" name="Text Placeholder 3">
             <a:extLst>
               <a:ext uri="{FF2B5EF4-FFF2-40B4-BE49-F238E27FC236}">
-                <a16:creationId xmlns:a16="http://schemas.microsoft.com/office/drawing/2014/main" id="{6842BA14-C681-82EB-BA21-3D3BF27B18BD}"/>
+                <a16:creationId xmlns:a16="http://schemas.microsoft.com/office/drawing/2014/main" id="{1886AB86-2356-D6B7-F4D5-2C1E7EB28C46}"/>
               </a:ext>
             </a:extLst>
           </p:cNvPr>
@@ -2742,7 +2743,7 @@
           <p:cNvPr id="5" name="Date Placeholder 4">
             <a:extLst>
               <a:ext uri="{FF2B5EF4-FFF2-40B4-BE49-F238E27FC236}">
-                <a16:creationId xmlns:a16="http://schemas.microsoft.com/office/drawing/2014/main" id="{9C8C61ED-A260-0DFF-EF45-BDE613BFD458}"/>
+                <a16:creationId xmlns:a16="http://schemas.microsoft.com/office/drawing/2014/main" id="{88F58113-0F7C-CE66-458C-529AC5169B35}"/>
               </a:ext>
             </a:extLst>
           </p:cNvPr>
@@ -2760,7 +2761,7 @@
           <a:p>
             <a:fld id="{523E3A8D-1BBF-408C-BE31-EEFCCA190D99}" type="datetimeFigureOut">
               <a:rPr lang="hu-HU" smtClean="0"/>
-              <a:t>2024. 03. 19.</a:t>
+              <a:t>2024. 03. 21.</a:t>
             </a:fld>
             <a:endParaRPr lang="hu-HU"/>
           </a:p>
@@ -2771,7 +2772,7 @@
           <p:cNvPr id="6" name="Footer Placeholder 5">
             <a:extLst>
               <a:ext uri="{FF2B5EF4-FFF2-40B4-BE49-F238E27FC236}">
-                <a16:creationId xmlns:a16="http://schemas.microsoft.com/office/drawing/2014/main" id="{382312F7-95D4-D684-7255-047453931003}"/>
+                <a16:creationId xmlns:a16="http://schemas.microsoft.com/office/drawing/2014/main" id="{71D6F714-DE87-714F-ECC6-DA630469A725}"/>
               </a:ext>
             </a:extLst>
           </p:cNvPr>
@@ -2796,7 +2797,7 @@
           <p:cNvPr id="7" name="Slide Number Placeholder 6">
             <a:extLst>
               <a:ext uri="{FF2B5EF4-FFF2-40B4-BE49-F238E27FC236}">
-                <a16:creationId xmlns:a16="http://schemas.microsoft.com/office/drawing/2014/main" id="{88809DB7-3BE7-0709-48AA-3BB86B6B330D}"/>
+                <a16:creationId xmlns:a16="http://schemas.microsoft.com/office/drawing/2014/main" id="{11AB5DEA-B4A5-DFDA-3F61-9809F90F4FB0}"/>
               </a:ext>
             </a:extLst>
           </p:cNvPr>
@@ -2823,7 +2824,7 @@
     </p:spTree>
     <p:extLst>
       <p:ext uri="{BB962C8B-B14F-4D97-AF65-F5344CB8AC3E}">
-        <p14:creationId xmlns:p14="http://schemas.microsoft.com/office/powerpoint/2010/main" val="1493196308"/>
+        <p14:creationId xmlns:p14="http://schemas.microsoft.com/office/powerpoint/2010/main" val="1108776786"/>
       </p:ext>
     </p:extLst>
   </p:cSld>
@@ -2855,7 +2856,7 @@
           <p:cNvPr id="2" name="Title 1">
             <a:extLst>
               <a:ext uri="{FF2B5EF4-FFF2-40B4-BE49-F238E27FC236}">
-                <a16:creationId xmlns:a16="http://schemas.microsoft.com/office/drawing/2014/main" id="{88545B8F-66DB-BE0C-A5D9-585EBDC610B6}"/>
+                <a16:creationId xmlns:a16="http://schemas.microsoft.com/office/drawing/2014/main" id="{09945CAA-2C77-0519-790B-427342B843C0}"/>
               </a:ext>
             </a:extLst>
           </p:cNvPr>
@@ -2893,7 +2894,7 @@
           <p:cNvPr id="3" name="Picture Placeholder 2">
             <a:extLst>
               <a:ext uri="{FF2B5EF4-FFF2-40B4-BE49-F238E27FC236}">
-                <a16:creationId xmlns:a16="http://schemas.microsoft.com/office/drawing/2014/main" id="{C1099B02-226F-1D9B-DFB0-23333C7B072A}"/>
+                <a16:creationId xmlns:a16="http://schemas.microsoft.com/office/drawing/2014/main" id="{B97B48F4-BB8E-1F12-1F9C-585C3CC6C659}"/>
               </a:ext>
             </a:extLst>
           </p:cNvPr>
@@ -2960,7 +2961,7 @@
           <p:cNvPr id="4" name="Text Placeholder 3">
             <a:extLst>
               <a:ext uri="{FF2B5EF4-FFF2-40B4-BE49-F238E27FC236}">
-                <a16:creationId xmlns:a16="http://schemas.microsoft.com/office/drawing/2014/main" id="{7A854F38-F12A-3293-A18C-B04956A0D919}"/>
+                <a16:creationId xmlns:a16="http://schemas.microsoft.com/office/drawing/2014/main" id="{3CD94A8C-9205-A084-1CDA-1F3B891EDD8C}"/>
               </a:ext>
             </a:extLst>
           </p:cNvPr>
@@ -3031,7 +3032,7 @@
           <p:cNvPr id="5" name="Date Placeholder 4">
             <a:extLst>
               <a:ext uri="{FF2B5EF4-FFF2-40B4-BE49-F238E27FC236}">
-                <a16:creationId xmlns:a16="http://schemas.microsoft.com/office/drawing/2014/main" id="{D9C59F54-9E56-A346-CE1F-67A5C84B06AF}"/>
+                <a16:creationId xmlns:a16="http://schemas.microsoft.com/office/drawing/2014/main" id="{3443D154-1FD0-969F-8AFF-93B7787ADB60}"/>
               </a:ext>
             </a:extLst>
           </p:cNvPr>
@@ -3049,7 +3050,7 @@
           <a:p>
             <a:fld id="{523E3A8D-1BBF-408C-BE31-EEFCCA190D99}" type="datetimeFigureOut">
               <a:rPr lang="hu-HU" smtClean="0"/>
-              <a:t>2024. 03. 19.</a:t>
+              <a:t>2024. 03. 21.</a:t>
             </a:fld>
             <a:endParaRPr lang="hu-HU"/>
           </a:p>
@@ -3060,7 +3061,7 @@
           <p:cNvPr id="6" name="Footer Placeholder 5">
             <a:extLst>
               <a:ext uri="{FF2B5EF4-FFF2-40B4-BE49-F238E27FC236}">
-                <a16:creationId xmlns:a16="http://schemas.microsoft.com/office/drawing/2014/main" id="{8ED4DCFA-EDA4-8E30-A99A-695646220FEA}"/>
+                <a16:creationId xmlns:a16="http://schemas.microsoft.com/office/drawing/2014/main" id="{1D725718-A91D-BB7F-7580-0796EB3707B4}"/>
               </a:ext>
             </a:extLst>
           </p:cNvPr>
@@ -3085,7 +3086,7 @@
           <p:cNvPr id="7" name="Slide Number Placeholder 6">
             <a:extLst>
               <a:ext uri="{FF2B5EF4-FFF2-40B4-BE49-F238E27FC236}">
-                <a16:creationId xmlns:a16="http://schemas.microsoft.com/office/drawing/2014/main" id="{57F6303E-2F07-BA9A-27D8-575A26B8E25E}"/>
+                <a16:creationId xmlns:a16="http://schemas.microsoft.com/office/drawing/2014/main" id="{E7710D50-C10D-C3C3-E64B-56E3D28E93AE}"/>
               </a:ext>
             </a:extLst>
           </p:cNvPr>
@@ -3112,7 +3113,7 @@
     </p:spTree>
     <p:extLst>
       <p:ext uri="{BB962C8B-B14F-4D97-AF65-F5344CB8AC3E}">
-        <p14:creationId xmlns:p14="http://schemas.microsoft.com/office/powerpoint/2010/main" val="868825574"/>
+        <p14:creationId xmlns:p14="http://schemas.microsoft.com/office/powerpoint/2010/main" val="1173371064"/>
       </p:ext>
     </p:extLst>
   </p:cSld>
@@ -3149,7 +3150,7 @@
           <p:cNvPr id="2" name="Title Placeholder 1">
             <a:extLst>
               <a:ext uri="{FF2B5EF4-FFF2-40B4-BE49-F238E27FC236}">
-                <a16:creationId xmlns:a16="http://schemas.microsoft.com/office/drawing/2014/main" id="{C5D0B662-2DDE-D23D-7961-9D1A0B3A945C}"/>
+                <a16:creationId xmlns:a16="http://schemas.microsoft.com/office/drawing/2014/main" id="{F688EA2E-C6EB-5124-E478-AF5E4B7133CA}"/>
               </a:ext>
             </a:extLst>
           </p:cNvPr>
@@ -3188,7 +3189,7 @@
           <p:cNvPr id="3" name="Text Placeholder 2">
             <a:extLst>
               <a:ext uri="{FF2B5EF4-FFF2-40B4-BE49-F238E27FC236}">
-                <a16:creationId xmlns:a16="http://schemas.microsoft.com/office/drawing/2014/main" id="{4AB718B6-7781-EE2B-5450-D64B1BF1F2B7}"/>
+                <a16:creationId xmlns:a16="http://schemas.microsoft.com/office/drawing/2014/main" id="{AD8EEC30-C03C-9DB0-DDD0-7B32527219ED}"/>
               </a:ext>
             </a:extLst>
           </p:cNvPr>
@@ -3256,7 +3257,7 @@
           <p:cNvPr id="4" name="Date Placeholder 3">
             <a:extLst>
               <a:ext uri="{FF2B5EF4-FFF2-40B4-BE49-F238E27FC236}">
-                <a16:creationId xmlns:a16="http://schemas.microsoft.com/office/drawing/2014/main" id="{135D3F33-89A2-CC1E-17AC-C44024DC1695}"/>
+                <a16:creationId xmlns:a16="http://schemas.microsoft.com/office/drawing/2014/main" id="{99CFD581-6D46-13E4-F713-E89B9E219BAC}"/>
               </a:ext>
             </a:extLst>
           </p:cNvPr>
@@ -3283,7 +3284,7 @@
               <a:defRPr sz="1200">
                 <a:solidFill>
                   <a:schemeClr val="tx1">
-                    <a:tint val="75000"/>
+                    <a:tint val="82000"/>
                   </a:schemeClr>
                 </a:solidFill>
               </a:defRPr>
@@ -3292,7 +3293,7 @@
           <a:p>
             <a:fld id="{523E3A8D-1BBF-408C-BE31-EEFCCA190D99}" type="datetimeFigureOut">
               <a:rPr lang="hu-HU" smtClean="0"/>
-              <a:t>2024. 03. 19.</a:t>
+              <a:t>2024. 03. 21.</a:t>
             </a:fld>
             <a:endParaRPr lang="hu-HU"/>
           </a:p>
@@ -3303,7 +3304,7 @@
           <p:cNvPr id="5" name="Footer Placeholder 4">
             <a:extLst>
               <a:ext uri="{FF2B5EF4-FFF2-40B4-BE49-F238E27FC236}">
-                <a16:creationId xmlns:a16="http://schemas.microsoft.com/office/drawing/2014/main" id="{476929E4-24C4-9336-05BC-A98251F85AEF}"/>
+                <a16:creationId xmlns:a16="http://schemas.microsoft.com/office/drawing/2014/main" id="{9A7A2AD1-56D2-D6FB-56FD-9B8CB8CD447C}"/>
               </a:ext>
             </a:extLst>
           </p:cNvPr>
@@ -3330,7 +3331,7 @@
               <a:defRPr sz="1200">
                 <a:solidFill>
                   <a:schemeClr val="tx1">
-                    <a:tint val="75000"/>
+                    <a:tint val="82000"/>
                   </a:schemeClr>
                 </a:solidFill>
               </a:defRPr>
@@ -3346,7 +3347,7 @@
           <p:cNvPr id="6" name="Slide Number Placeholder 5">
             <a:extLst>
               <a:ext uri="{FF2B5EF4-FFF2-40B4-BE49-F238E27FC236}">
-                <a16:creationId xmlns:a16="http://schemas.microsoft.com/office/drawing/2014/main" id="{72CF723B-74AC-B405-3E0D-DE7ED99F9E4D}"/>
+                <a16:creationId xmlns:a16="http://schemas.microsoft.com/office/drawing/2014/main" id="{3BB4BDA7-F1AE-87C6-D396-3BFE825F09BD}"/>
               </a:ext>
             </a:extLst>
           </p:cNvPr>
@@ -3373,7 +3374,7 @@
               <a:defRPr sz="1200">
                 <a:solidFill>
                   <a:schemeClr val="tx1">
-                    <a:tint val="75000"/>
+                    <a:tint val="82000"/>
                   </a:schemeClr>
                 </a:solidFill>
               </a:defRPr>
@@ -3391,23 +3392,23 @@
     </p:spTree>
     <p:extLst>
       <p:ext uri="{BB962C8B-B14F-4D97-AF65-F5344CB8AC3E}">
-        <p14:creationId xmlns:p14="http://schemas.microsoft.com/office/powerpoint/2010/main" val="1927422858"/>
+        <p14:creationId xmlns:p14="http://schemas.microsoft.com/office/powerpoint/2010/main" val="2539251978"/>
       </p:ext>
     </p:extLst>
   </p:cSld>
   <p:clrMap bg1="lt1" tx1="dk1" bg2="lt2" tx2="dk2" accent1="accent1" accent2="accent2" accent3="accent3" accent4="accent4" accent5="accent5" accent6="accent6" hlink="hlink" folHlink="folHlink"/>
   <p:sldLayoutIdLst>
-    <p:sldLayoutId id="2147483991" r:id="rId1"/>
-    <p:sldLayoutId id="2147483992" r:id="rId2"/>
-    <p:sldLayoutId id="2147483993" r:id="rId3"/>
-    <p:sldLayoutId id="2147483994" r:id="rId4"/>
-    <p:sldLayoutId id="2147483995" r:id="rId5"/>
-    <p:sldLayoutId id="2147483996" r:id="rId6"/>
-    <p:sldLayoutId id="2147483997" r:id="rId7"/>
-    <p:sldLayoutId id="2147483998" r:id="rId8"/>
-    <p:sldLayoutId id="2147483999" r:id="rId9"/>
-    <p:sldLayoutId id="2147484000" r:id="rId10"/>
-    <p:sldLayoutId id="2147484001" r:id="rId11"/>
+    <p:sldLayoutId id="2147484135" r:id="rId1"/>
+    <p:sldLayoutId id="2147484136" r:id="rId2"/>
+    <p:sldLayoutId id="2147484137" r:id="rId3"/>
+    <p:sldLayoutId id="2147484138" r:id="rId4"/>
+    <p:sldLayoutId id="2147484139" r:id="rId5"/>
+    <p:sldLayoutId id="2147484140" r:id="rId6"/>
+    <p:sldLayoutId id="2147484141" r:id="rId7"/>
+    <p:sldLayoutId id="2147484142" r:id="rId8"/>
+    <p:sldLayoutId id="2147484143" r:id="rId9"/>
+    <p:sldLayoutId id="2147484144" r:id="rId10"/>
+    <p:sldLayoutId id="2147484145" r:id="rId11"/>
   </p:sldLayoutIdLst>
   <p:txStyles>
     <p:titleStyle>
@@ -3771,26 +3772,6 @@
                 <a:ea typeface="Tahoma" panose="020B0604030504040204" pitchFamily="34" charset="0"/>
                 <a:cs typeface="Tahoma" panose="020B0604030504040204" pitchFamily="34" charset="0"/>
               </a:rPr>
-              <a:t>Kovács Dániel</a:t>
-            </a:r>
-          </a:p>
-          <a:p>
-            <a:r>
-              <a:rPr lang="hu-HU" dirty="0">
-                <a:latin typeface="Tahoma" panose="020B0604030504040204" pitchFamily="34" charset="0"/>
-                <a:ea typeface="Tahoma" panose="020B0604030504040204" pitchFamily="34" charset="0"/>
-                <a:cs typeface="Tahoma" panose="020B0604030504040204" pitchFamily="34" charset="0"/>
-              </a:rPr>
-              <a:t>Braczkó Tamás</a:t>
-            </a:r>
-          </a:p>
-          <a:p>
-            <a:r>
-              <a:rPr lang="hu-HU" dirty="0">
-                <a:latin typeface="Tahoma" panose="020B0604030504040204" pitchFamily="34" charset="0"/>
-                <a:ea typeface="Tahoma" panose="020B0604030504040204" pitchFamily="34" charset="0"/>
-                <a:cs typeface="Tahoma" panose="020B0604030504040204" pitchFamily="34" charset="0"/>
-              </a:rPr>
               <a:t>Novák Dominik Viktor</a:t>
             </a:r>
           </a:p>
@@ -3831,6 +3812,140 @@
           <p:cNvPr id="2" name="Title 1">
             <a:extLst>
               <a:ext uri="{FF2B5EF4-FFF2-40B4-BE49-F238E27FC236}">
+                <a16:creationId xmlns:a16="http://schemas.microsoft.com/office/drawing/2014/main" id="{23583795-A5EC-C91A-111D-B29BFD4D56F9}"/>
+              </a:ext>
+            </a:extLst>
+          </p:cNvPr>
+          <p:cNvSpPr>
+            <a:spLocks noGrp="1"/>
+          </p:cNvSpPr>
+          <p:nvPr>
+            <p:ph type="title"/>
+          </p:nvPr>
+        </p:nvSpPr>
+        <p:spPr/>
+        <p:txBody>
+          <a:bodyPr/>
+          <a:lstStyle/>
+          <a:p>
+            <a:r>
+              <a:rPr lang="hu-HU" dirty="0">
+                <a:latin typeface="Tahoma" panose="020B0604030504040204" pitchFamily="34" charset="0"/>
+                <a:ea typeface="Tahoma" panose="020B0604030504040204" pitchFamily="34" charset="0"/>
+                <a:cs typeface="Tahoma" panose="020B0604030504040204" pitchFamily="34" charset="0"/>
+              </a:rPr>
+              <a:t>Rendelés esetén</a:t>
+            </a:r>
+            <a:endParaRPr lang="hu-HU" dirty="0"/>
+          </a:p>
+        </p:txBody>
+      </p:sp>
+      <p:pic>
+        <p:nvPicPr>
+          <p:cNvPr id="13" name="Content Placeholder 12">
+            <a:extLst>
+              <a:ext uri="{FF2B5EF4-FFF2-40B4-BE49-F238E27FC236}">
+                <a16:creationId xmlns:a16="http://schemas.microsoft.com/office/drawing/2014/main" id="{C9675842-F2A8-1C83-2A65-FD7A2A85784F}"/>
+              </a:ext>
+            </a:extLst>
+          </p:cNvPr>
+          <p:cNvPicPr>
+            <a:picLocks noGrp="1" noChangeAspect="1"/>
+          </p:cNvPicPr>
+          <p:nvPr>
+            <p:ph idx="1"/>
+          </p:nvPr>
+        </p:nvPicPr>
+        <p:blipFill>
+          <a:blip r:embed="rId2">
+            <a:extLst>
+              <a:ext uri="{28A0092B-C50C-407E-A947-70E740481C1C}">
+                <a14:useLocalDpi xmlns:a14="http://schemas.microsoft.com/office/drawing/2010/main" val="0"/>
+              </a:ext>
+            </a:extLst>
+          </a:blip>
+          <a:stretch>
+            <a:fillRect/>
+          </a:stretch>
+        </p:blipFill>
+        <p:spPr>
+          <a:xfrm>
+            <a:off x="157816" y="2520299"/>
+            <a:ext cx="7466690" cy="3353121"/>
+          </a:xfrm>
+        </p:spPr>
+      </p:pic>
+      <p:pic>
+        <p:nvPicPr>
+          <p:cNvPr id="9" name="Picture 8">
+            <a:extLst>
+              <a:ext uri="{FF2B5EF4-FFF2-40B4-BE49-F238E27FC236}">
+                <a16:creationId xmlns:a16="http://schemas.microsoft.com/office/drawing/2014/main" id="{FA3F7824-1CA2-AFD6-A5F6-F3EFF09012B1}"/>
+              </a:ext>
+            </a:extLst>
+          </p:cNvPr>
+          <p:cNvPicPr>
+            <a:picLocks noChangeAspect="1"/>
+          </p:cNvPicPr>
+          <p:nvPr/>
+        </p:nvPicPr>
+        <p:blipFill>
+          <a:blip r:embed="rId3">
+            <a:extLst>
+              <a:ext uri="{28A0092B-C50C-407E-A947-70E740481C1C}">
+                <a14:useLocalDpi xmlns:a14="http://schemas.microsoft.com/office/drawing/2010/main" val="0"/>
+              </a:ext>
+            </a:extLst>
+          </a:blip>
+          <a:stretch>
+            <a:fillRect/>
+          </a:stretch>
+        </p:blipFill>
+        <p:spPr>
+          <a:xfrm>
+            <a:off x="7624506" y="2520298"/>
+            <a:ext cx="4567494" cy="3353121"/>
+          </a:xfrm>
+          <a:prstGeom prst="rect">
+            <a:avLst/>
+          </a:prstGeom>
+        </p:spPr>
+      </p:pic>
+    </p:spTree>
+    <p:extLst>
+      <p:ext uri="{BB962C8B-B14F-4D97-AF65-F5344CB8AC3E}">
+        <p14:creationId xmlns:p14="http://schemas.microsoft.com/office/powerpoint/2010/main" val="3405700671"/>
+      </p:ext>
+    </p:extLst>
+  </p:cSld>
+  <p:clrMapOvr>
+    <a:masterClrMapping/>
+  </p:clrMapOvr>
+</p:sld>
+</file>
+
+<file path=ppt/slides/slide11.xml><?xml version="1.0" encoding="utf-8"?>
+<p:sld xmlns:a="http://schemas.openxmlformats.org/drawingml/2006/main" xmlns:r="http://schemas.openxmlformats.org/officeDocument/2006/relationships" xmlns:p="http://schemas.openxmlformats.org/presentationml/2006/main">
+  <p:cSld>
+    <p:spTree>
+      <p:nvGrpSpPr>
+        <p:cNvPr id="1" name=""/>
+        <p:cNvGrpSpPr/>
+        <p:nvPr/>
+      </p:nvGrpSpPr>
+      <p:grpSpPr>
+        <a:xfrm>
+          <a:off x="0" y="0"/>
+          <a:ext cx="0" cy="0"/>
+          <a:chOff x="0" y="0"/>
+          <a:chExt cx="0" cy="0"/>
+        </a:xfrm>
+      </p:grpSpPr>
+      <p:sp>
+        <p:nvSpPr>
+          <p:cNvPr id="2" name="Title 1">
+            <a:extLst>
+              <a:ext uri="{FF2B5EF4-FFF2-40B4-BE49-F238E27FC236}">
                 <a16:creationId xmlns:a16="http://schemas.microsoft.com/office/drawing/2014/main" id="{6CD337EB-25D6-B886-82CB-FD5DFD4C06F8}"/>
               </a:ext>
             </a:extLst>
@@ -3849,7 +3964,9 @@
           </a:xfrm>
         </p:spPr>
         <p:txBody>
-          <a:bodyPr/>
+          <a:bodyPr>
+            <a:normAutofit/>
+          </a:bodyPr>
           <a:lstStyle/>
           <a:p>
             <a:r>
@@ -3898,7 +4015,7 @@
           <p:cNvPr id="2" name="Title 1">
             <a:extLst>
               <a:ext uri="{FF2B5EF4-FFF2-40B4-BE49-F238E27FC236}">
-                <a16:creationId xmlns:a16="http://schemas.microsoft.com/office/drawing/2014/main" id="{7F384A82-8E20-9CC9-636E-0624810E7C1B}"/>
+                <a16:creationId xmlns:a16="http://schemas.microsoft.com/office/drawing/2014/main" id="{2E6324BD-B71D-2FA6-7009-A5C19BB97525}"/>
               </a:ext>
             </a:extLst>
           </p:cNvPr>
@@ -3920,7 +4037,7 @@
                 <a:ea typeface="Tahoma" panose="020B0604030504040204" pitchFamily="34" charset="0"/>
                 <a:cs typeface="Tahoma" panose="020B0604030504040204" pitchFamily="34" charset="0"/>
               </a:rPr>
-              <a:t>Material-UI: A Frontend Varázslat Három Kattintással</a:t>
+              <a:t>React: Hatékony UI-fejlesztés</a:t>
             </a:r>
           </a:p>
         </p:txBody>
@@ -3930,7 +4047,7 @@
           <p:cNvPr id="3" name="Content Placeholder 2">
             <a:extLst>
               <a:ext uri="{FF2B5EF4-FFF2-40B4-BE49-F238E27FC236}">
-                <a16:creationId xmlns:a16="http://schemas.microsoft.com/office/drawing/2014/main" id="{8D2243C9-F2DC-A114-9D08-CEA8D253E4B1}"/>
+                <a16:creationId xmlns:a16="http://schemas.microsoft.com/office/drawing/2014/main" id="{C835DAC4-32D9-7E0D-A2F4-E20CD3E81CFC}"/>
               </a:ext>
             </a:extLst>
           </p:cNvPr>
@@ -3941,87 +4058,82 @@
             <p:ph idx="1"/>
           </p:nvPr>
         </p:nvSpPr>
-        <p:spPr>
-          <a:xfrm>
-            <a:off x="838200" y="2047104"/>
-            <a:ext cx="10515600" cy="4351338"/>
-          </a:xfrm>
-        </p:spPr>
+        <p:spPr/>
         <p:txBody>
           <a:bodyPr>
-            <a:normAutofit fontScale="92500" lnSpcReduction="10000"/>
+            <a:noAutofit/>
           </a:bodyPr>
           <a:lstStyle/>
           <a:p>
             <a:r>
-              <a:rPr lang="hu-HU" b="1" dirty="0">
+              <a:rPr lang="hu-HU" sz="2400" b="1" dirty="0">
                 <a:latin typeface="Tahoma" panose="020B0604030504040204" pitchFamily="34" charset="0"/>
                 <a:ea typeface="Tahoma" panose="020B0604030504040204" pitchFamily="34" charset="0"/>
                 <a:cs typeface="Tahoma" panose="020B0604030504040204" pitchFamily="34" charset="0"/>
               </a:rPr>
-              <a:t>Gyors és hatékony frontend fejlesztés</a:t>
-            </a:r>
-            <a:r>
-              <a:rPr lang="hu-HU" dirty="0">
+              <a:t>Deklaratív hatékonyság</a:t>
+            </a:r>
+            <a:r>
+              <a:rPr lang="hu-HU" sz="2400" dirty="0">
                 <a:latin typeface="Tahoma" panose="020B0604030504040204" pitchFamily="34" charset="0"/>
                 <a:ea typeface="Tahoma" panose="020B0604030504040204" pitchFamily="34" charset="0"/>
                 <a:cs typeface="Tahoma" panose="020B0604030504040204" pitchFamily="34" charset="0"/>
               </a:rPr>
-              <a:t>: A Material-UI előre elkészített UI komponenseket kínál, így gyorsan és hatékonyan lehet frontend alkalmazásokat fejleszteni.</a:t>
-            </a:r>
-          </a:p>
-          <a:p>
-            <a:r>
-              <a:rPr lang="hu-HU" b="1" dirty="0">
+              <a:t>: A React deklaratív megközelítést alkalmaz, ami egyszerűbbé és hatékonyabbá teszi a felhasználói felületek készítését.</a:t>
+            </a:r>
+          </a:p>
+          <a:p>
+            <a:r>
+              <a:rPr lang="hu-HU" sz="2400" b="1" dirty="0">
                 <a:latin typeface="Tahoma" panose="020B0604030504040204" pitchFamily="34" charset="0"/>
                 <a:ea typeface="Tahoma" panose="020B0604030504040204" pitchFamily="34" charset="0"/>
                 <a:cs typeface="Tahoma" panose="020B0604030504040204" pitchFamily="34" charset="0"/>
               </a:rPr>
-              <a:t>Rugalmas és könnyen testreszerezhető dizájn</a:t>
-            </a:r>
-            <a:r>
-              <a:rPr lang="hu-HU" dirty="0">
+              <a:t>Komponens alapú struktúra</a:t>
+            </a:r>
+            <a:r>
+              <a:rPr lang="hu-HU" sz="2400" dirty="0">
                 <a:latin typeface="Tahoma" panose="020B0604030504040204" pitchFamily="34" charset="0"/>
                 <a:ea typeface="Tahoma" panose="020B0604030504040204" pitchFamily="34" charset="0"/>
                 <a:cs typeface="Tahoma" panose="020B0604030504040204" pitchFamily="34" charset="0"/>
               </a:rPr>
-              <a:t>: Egyszerűen testreszabhatóak a dizájn elemek a projekt igényeinek megfelelően.</a:t>
-            </a:r>
-          </a:p>
-          <a:p>
-            <a:r>
-              <a:rPr lang="hu-HU" b="1" dirty="0">
+              <a:t>: A React komponens alapú megközelítést használ, ami lehetővé teszi a felületek könnyű újrafelhasználását és kezelhetőségét.</a:t>
+            </a:r>
+          </a:p>
+          <a:p>
+            <a:r>
+              <a:rPr lang="hu-HU" sz="2400" b="1" dirty="0">
                 <a:latin typeface="Tahoma" panose="020B0604030504040204" pitchFamily="34" charset="0"/>
                 <a:ea typeface="Tahoma" panose="020B0604030504040204" pitchFamily="34" charset="0"/>
                 <a:cs typeface="Tahoma" panose="020B0604030504040204" pitchFamily="34" charset="0"/>
               </a:rPr>
-              <a:t>Egyszerű integráció és használat</a:t>
-            </a:r>
-            <a:r>
-              <a:rPr lang="hu-HU" dirty="0">
+              <a:t>Virtual DOM optimalizáció</a:t>
+            </a:r>
+            <a:r>
+              <a:rPr lang="hu-HU" sz="2400" dirty="0">
                 <a:latin typeface="Tahoma" panose="020B0604030504040204" pitchFamily="34" charset="0"/>
                 <a:ea typeface="Tahoma" panose="020B0604030504040204" pitchFamily="34" charset="0"/>
                 <a:cs typeface="Tahoma" panose="020B0604030504040204" pitchFamily="34" charset="0"/>
               </a:rPr>
-              <a:t>: Könnyen integrálható a React-alapú projektekbe, így kezdő és tapasztalt fejlesztők egyaránt könnyen használhatják.</a:t>
-            </a:r>
-          </a:p>
-          <a:p>
-            <a:r>
-              <a:rPr lang="hu-HU" b="1" dirty="0">
+              <a:t>: A React Virtual DOM-ot használ, ami gyors és hatékony UI frissítéseket tesz lehetővé, minimalizálva a valós DOM manipulációját.</a:t>
+            </a:r>
+          </a:p>
+          <a:p>
+            <a:r>
+              <a:rPr lang="hu-HU" sz="2400" b="1" dirty="0">
                 <a:latin typeface="Tahoma" panose="020B0604030504040204" pitchFamily="34" charset="0"/>
                 <a:ea typeface="Tahoma" panose="020B0604030504040204" pitchFamily="34" charset="0"/>
                 <a:cs typeface="Tahoma" panose="020B0604030504040204" pitchFamily="34" charset="0"/>
               </a:rPr>
-              <a:t>Előre elkészített komponensek és stílusok</a:t>
-            </a:r>
-            <a:r>
-              <a:rPr lang="hu-HU" dirty="0">
+              <a:t>Együttműködés más technológiákkal</a:t>
+            </a:r>
+            <a:r>
+              <a:rPr lang="hu-HU" sz="2400" dirty="0">
                 <a:latin typeface="Tahoma" panose="020B0604030504040204" pitchFamily="34" charset="0"/>
                 <a:ea typeface="Tahoma" panose="020B0604030504040204" pitchFamily="34" charset="0"/>
                 <a:cs typeface="Tahoma" panose="020B0604030504040204" pitchFamily="34" charset="0"/>
               </a:rPr>
-              <a:t>: A Material-UI kész komponenseket és stílusokat kínál, amelyekkel egyszerűen építhetők fel modern felhasználói felületek.</a:t>
+              <a:t>: A React könnyen integrálható más technológiákkal, mint például a Redux vagy a GraphQL, lehetővé téve erőteljes alkalmazások fejlesztését.</a:t>
             </a:r>
           </a:p>
         </p:txBody>
@@ -4029,7 +4141,7 @@
     </p:spTree>
     <p:extLst>
       <p:ext uri="{BB962C8B-B14F-4D97-AF65-F5344CB8AC3E}">
-        <p14:creationId xmlns:p14="http://schemas.microsoft.com/office/powerpoint/2010/main" val="3272475042"/>
+        <p14:creationId xmlns:p14="http://schemas.microsoft.com/office/powerpoint/2010/main" val="4045262457"/>
       </p:ext>
     </p:extLst>
   </p:cSld>
@@ -4061,7 +4173,7 @@
           <p:cNvPr id="2" name="Title 1">
             <a:extLst>
               <a:ext uri="{FF2B5EF4-FFF2-40B4-BE49-F238E27FC236}">
-                <a16:creationId xmlns:a16="http://schemas.microsoft.com/office/drawing/2014/main" id="{22A4115C-DE9A-F61F-455A-AACE73E0B74A}"/>
+                <a16:creationId xmlns:a16="http://schemas.microsoft.com/office/drawing/2014/main" id="{7F384A82-8E20-9CC9-636E-0624810E7C1B}"/>
               </a:ext>
             </a:extLst>
           </p:cNvPr>
@@ -4074,7 +4186,9 @@
         </p:nvSpPr>
         <p:spPr/>
         <p:txBody>
-          <a:bodyPr/>
+          <a:bodyPr>
+            <a:normAutofit/>
+          </a:bodyPr>
           <a:lstStyle/>
           <a:p>
             <a:r>
@@ -4083,7 +4197,7 @@
                 <a:ea typeface="Tahoma" panose="020B0604030504040204" pitchFamily="34" charset="0"/>
                 <a:cs typeface="Tahoma" panose="020B0604030504040204" pitchFamily="34" charset="0"/>
               </a:rPr>
-              <a:t>Oldalak és funkciói</a:t>
+              <a:t>Material-UI: A Frontend Varázslat Három Kattintással</a:t>
             </a:r>
           </a:p>
         </p:txBody>
@@ -4093,7 +4207,7 @@
           <p:cNvPr id="3" name="Content Placeholder 2">
             <a:extLst>
               <a:ext uri="{FF2B5EF4-FFF2-40B4-BE49-F238E27FC236}">
-                <a16:creationId xmlns:a16="http://schemas.microsoft.com/office/drawing/2014/main" id="{8FD92E81-796C-B0CA-8983-BA0D8CB77FB6}"/>
+                <a16:creationId xmlns:a16="http://schemas.microsoft.com/office/drawing/2014/main" id="{8D2243C9-F2DC-A114-9D08-CEA8D253E4B1}"/>
               </a:ext>
             </a:extLst>
           </p:cNvPr>
@@ -4104,69 +4218,95 @@
             <p:ph idx="1"/>
           </p:nvPr>
         </p:nvSpPr>
-        <p:spPr/>
-        <p:txBody>
-          <a:bodyPr/>
-          <a:lstStyle/>
-          <a:p>
-            <a:r>
-              <a:rPr lang="hu-HU" dirty="0">
+        <p:spPr>
+          <a:xfrm>
+            <a:off x="838200" y="2047104"/>
+            <a:ext cx="10515600" cy="4351338"/>
+          </a:xfrm>
+        </p:spPr>
+        <p:txBody>
+          <a:bodyPr>
+            <a:normAutofit/>
+          </a:bodyPr>
+          <a:lstStyle/>
+          <a:p>
+            <a:r>
+              <a:rPr lang="hu-HU" sz="2400" b="1" dirty="0">
                 <a:latin typeface="Tahoma" panose="020B0604030504040204" pitchFamily="34" charset="0"/>
                 <a:ea typeface="Tahoma" panose="020B0604030504040204" pitchFamily="34" charset="0"/>
                 <a:cs typeface="Tahoma" panose="020B0604030504040204" pitchFamily="34" charset="0"/>
               </a:rPr>
-              <a:t>Főoldal</a:t>
-            </a:r>
-          </a:p>
-          <a:p>
-            <a:r>
-              <a:rPr lang="hu-HU" dirty="0">
+              <a:t>Gyors és hatékony frontend fejlesztés</a:t>
+            </a:r>
+            <a:r>
+              <a:rPr lang="hu-HU" sz="2400" dirty="0">
                 <a:latin typeface="Tahoma" panose="020B0604030504040204" pitchFamily="34" charset="0"/>
                 <a:ea typeface="Tahoma" panose="020B0604030504040204" pitchFamily="34" charset="0"/>
                 <a:cs typeface="Tahoma" panose="020B0604030504040204" pitchFamily="34" charset="0"/>
               </a:rPr>
-              <a:t>Termékek</a:t>
-            </a:r>
-          </a:p>
-          <a:p>
-            <a:r>
-              <a:rPr lang="hu-HU" dirty="0">
+              <a:t>: A Material-UI előre elkészített UI komponenseket kínál, így gyorsan és hatékonyan lehet frontend alkalmazásokat fejleszteni.</a:t>
+            </a:r>
+          </a:p>
+          <a:p>
+            <a:r>
+              <a:rPr lang="hu-HU" sz="2400" b="1" dirty="0">
                 <a:latin typeface="Tahoma" panose="020B0604030504040204" pitchFamily="34" charset="0"/>
                 <a:ea typeface="Tahoma" panose="020B0604030504040204" pitchFamily="34" charset="0"/>
                 <a:cs typeface="Tahoma" panose="020B0604030504040204" pitchFamily="34" charset="0"/>
               </a:rPr>
-              <a:t>Regisztráció</a:t>
-            </a:r>
-          </a:p>
-          <a:p>
-            <a:r>
-              <a:rPr lang="hu-HU" dirty="0">
+              <a:t>Rugalmas és könnyen testreszerezhető dizájn</a:t>
+            </a:r>
+            <a:r>
+              <a:rPr lang="hu-HU" sz="2400" dirty="0">
                 <a:latin typeface="Tahoma" panose="020B0604030504040204" pitchFamily="34" charset="0"/>
                 <a:ea typeface="Tahoma" panose="020B0604030504040204" pitchFamily="34" charset="0"/>
                 <a:cs typeface="Tahoma" panose="020B0604030504040204" pitchFamily="34" charset="0"/>
               </a:rPr>
-              <a:t>Bejelentkezés</a:t>
-            </a:r>
-          </a:p>
-          <a:p>
-            <a:r>
-              <a:rPr lang="hu-HU" dirty="0">
+              <a:t>: Egyszerűen testreszabhatóak a dizájn elemek a projekt igényeinek megfelelően.</a:t>
+            </a:r>
+          </a:p>
+          <a:p>
+            <a:r>
+              <a:rPr lang="hu-HU" sz="2400" b="1" dirty="0">
                 <a:latin typeface="Tahoma" panose="020B0604030504040204" pitchFamily="34" charset="0"/>
                 <a:ea typeface="Tahoma" panose="020B0604030504040204" pitchFamily="34" charset="0"/>
                 <a:cs typeface="Tahoma" panose="020B0604030504040204" pitchFamily="34" charset="0"/>
               </a:rPr>
-              <a:t>Ügyfélszolgálat</a:t>
-            </a:r>
-          </a:p>
-          <a:p>
-            <a:endParaRPr lang="hu-HU" dirty="0"/>
+              <a:t>Egyszerű integráció és használat</a:t>
+            </a:r>
+            <a:r>
+              <a:rPr lang="hu-HU" sz="2400" dirty="0">
+                <a:latin typeface="Tahoma" panose="020B0604030504040204" pitchFamily="34" charset="0"/>
+                <a:ea typeface="Tahoma" panose="020B0604030504040204" pitchFamily="34" charset="0"/>
+                <a:cs typeface="Tahoma" panose="020B0604030504040204" pitchFamily="34" charset="0"/>
+              </a:rPr>
+              <a:t>: Könnyen integrálható a React-alapú projektekbe, így kezdő és tapasztalt fejlesztők egyaránt könnyen használhatják.</a:t>
+            </a:r>
+          </a:p>
+          <a:p>
+            <a:r>
+              <a:rPr lang="hu-HU" sz="2400" b="1" dirty="0">
+                <a:latin typeface="Tahoma" panose="020B0604030504040204" pitchFamily="34" charset="0"/>
+                <a:ea typeface="Tahoma" panose="020B0604030504040204" pitchFamily="34" charset="0"/>
+                <a:cs typeface="Tahoma" panose="020B0604030504040204" pitchFamily="34" charset="0"/>
+              </a:rPr>
+              <a:t>Előre elkészített komponensek és stílusok</a:t>
+            </a:r>
+            <a:r>
+              <a:rPr lang="hu-HU" sz="2400" dirty="0">
+                <a:latin typeface="Tahoma" panose="020B0604030504040204" pitchFamily="34" charset="0"/>
+                <a:ea typeface="Tahoma" panose="020B0604030504040204" pitchFamily="34" charset="0"/>
+                <a:cs typeface="Tahoma" panose="020B0604030504040204" pitchFamily="34" charset="0"/>
+              </a:rPr>
+              <a:t>: A Material-UI kész komponenseket és stílusokat kínál, amelyekkel egyszerűen építhetők fel modern felhasználói felületek.</a:t>
+            </a:r>
           </a:p>
         </p:txBody>
       </p:sp>
     </p:spTree>
     <p:extLst>
       <p:ext uri="{BB962C8B-B14F-4D97-AF65-F5344CB8AC3E}">
-        <p14:creationId xmlns:p14="http://schemas.microsoft.com/office/powerpoint/2010/main" val="615629016"/>
+        <p14:creationId xmlns:p14="http://schemas.microsoft.com/office/powerpoint/2010/main" val="3272475042"/>
       </p:ext>
     </p:extLst>
   </p:cSld>
@@ -4198,7 +4338,7 @@
           <p:cNvPr id="2" name="Title 1">
             <a:extLst>
               <a:ext uri="{FF2B5EF4-FFF2-40B4-BE49-F238E27FC236}">
-                <a16:creationId xmlns:a16="http://schemas.microsoft.com/office/drawing/2014/main" id="{E9A1961F-B856-0EDA-C806-A7335AFF5F1C}"/>
+                <a16:creationId xmlns:a16="http://schemas.microsoft.com/office/drawing/2014/main" id="{22A4115C-DE9A-F61F-455A-AACE73E0B74A}"/>
               </a:ext>
             </a:extLst>
           </p:cNvPr>
@@ -4215,60 +4355,95 @@
           <a:lstStyle/>
           <a:p>
             <a:r>
-              <a:rPr lang="hu-HU">
+              <a:rPr lang="hu-HU" dirty="0">
                 <a:latin typeface="Tahoma" panose="020B0604030504040204" pitchFamily="34" charset="0"/>
                 <a:ea typeface="Tahoma" panose="020B0604030504040204" pitchFamily="34" charset="0"/>
                 <a:cs typeface="Tahoma" panose="020B0604030504040204" pitchFamily="34" charset="0"/>
               </a:rPr>
-              <a:t>A főoldal</a:t>
-            </a:r>
-            <a:endParaRPr lang="hu-HU" dirty="0">
-              <a:latin typeface="Tahoma" panose="020B0604030504040204" pitchFamily="34" charset="0"/>
-              <a:ea typeface="Tahoma" panose="020B0604030504040204" pitchFamily="34" charset="0"/>
-              <a:cs typeface="Tahoma" panose="020B0604030504040204" pitchFamily="34" charset="0"/>
-            </a:endParaRPr>
-          </a:p>
-        </p:txBody>
-      </p:sp>
-      <p:pic>
-        <p:nvPicPr>
-          <p:cNvPr id="11" name="Content Placeholder 10" descr="A screenshot of a computer screen&#10;&#10;Description automatically generated">
-            <a:extLst>
-              <a:ext uri="{FF2B5EF4-FFF2-40B4-BE49-F238E27FC236}">
-                <a16:creationId xmlns:a16="http://schemas.microsoft.com/office/drawing/2014/main" id="{A470A64B-3D58-5626-5FA4-E3ABDA0E81C0}"/>
-              </a:ext>
-            </a:extLst>
-          </p:cNvPr>
-          <p:cNvPicPr>
-            <a:picLocks noGrp="1" noChangeAspect="1"/>
-          </p:cNvPicPr>
+              <a:t>Oldalak és funkciói</a:t>
+            </a:r>
+          </a:p>
+        </p:txBody>
+      </p:sp>
+      <p:sp>
+        <p:nvSpPr>
+          <p:cNvPr id="3" name="Content Placeholder 2">
+            <a:extLst>
+              <a:ext uri="{FF2B5EF4-FFF2-40B4-BE49-F238E27FC236}">
+                <a16:creationId xmlns:a16="http://schemas.microsoft.com/office/drawing/2014/main" id="{8FD92E81-796C-B0CA-8983-BA0D8CB77FB6}"/>
+              </a:ext>
+            </a:extLst>
+          </p:cNvPr>
+          <p:cNvSpPr>
+            <a:spLocks noGrp="1"/>
+          </p:cNvSpPr>
           <p:nvPr>
             <p:ph idx="1"/>
           </p:nvPr>
-        </p:nvPicPr>
-        <p:blipFill>
-          <a:blip r:embed="rId2">
-            <a:extLst>
-              <a:ext uri="{28A0092B-C50C-407E-A947-70E740481C1C}">
-                <a14:useLocalDpi xmlns:a14="http://schemas.microsoft.com/office/drawing/2010/main" val="0"/>
-              </a:ext>
-            </a:extLst>
-          </a:blip>
-          <a:stretch>
-            <a:fillRect/>
-          </a:stretch>
-        </p:blipFill>
-        <p:spPr>
-          <a:xfrm>
-            <a:off x="1630153" y="1874537"/>
-            <a:ext cx="8931693" cy="4351338"/>
-          </a:xfrm>
-        </p:spPr>
-      </p:pic>
+        </p:nvSpPr>
+        <p:spPr/>
+        <p:txBody>
+          <a:bodyPr/>
+          <a:lstStyle/>
+          <a:p>
+            <a:r>
+              <a:rPr lang="hu-HU" dirty="0">
+                <a:latin typeface="Tahoma" panose="020B0604030504040204" pitchFamily="34" charset="0"/>
+                <a:ea typeface="Tahoma" panose="020B0604030504040204" pitchFamily="34" charset="0"/>
+                <a:cs typeface="Tahoma" panose="020B0604030504040204" pitchFamily="34" charset="0"/>
+              </a:rPr>
+              <a:t>Főoldal</a:t>
+            </a:r>
+          </a:p>
+          <a:p>
+            <a:r>
+              <a:rPr lang="hu-HU" dirty="0">
+                <a:latin typeface="Tahoma" panose="020B0604030504040204" pitchFamily="34" charset="0"/>
+                <a:ea typeface="Tahoma" panose="020B0604030504040204" pitchFamily="34" charset="0"/>
+                <a:cs typeface="Tahoma" panose="020B0604030504040204" pitchFamily="34" charset="0"/>
+              </a:rPr>
+              <a:t>Termékek</a:t>
+            </a:r>
+          </a:p>
+          <a:p>
+            <a:r>
+              <a:rPr lang="hu-HU" dirty="0">
+                <a:latin typeface="Tahoma" panose="020B0604030504040204" pitchFamily="34" charset="0"/>
+                <a:ea typeface="Tahoma" panose="020B0604030504040204" pitchFamily="34" charset="0"/>
+                <a:cs typeface="Tahoma" panose="020B0604030504040204" pitchFamily="34" charset="0"/>
+              </a:rPr>
+              <a:t>Regisztráció</a:t>
+            </a:r>
+          </a:p>
+          <a:p>
+            <a:r>
+              <a:rPr lang="hu-HU" dirty="0">
+                <a:latin typeface="Tahoma" panose="020B0604030504040204" pitchFamily="34" charset="0"/>
+                <a:ea typeface="Tahoma" panose="020B0604030504040204" pitchFamily="34" charset="0"/>
+                <a:cs typeface="Tahoma" panose="020B0604030504040204" pitchFamily="34" charset="0"/>
+              </a:rPr>
+              <a:t>Bejelentkezés</a:t>
+            </a:r>
+          </a:p>
+          <a:p>
+            <a:r>
+              <a:rPr lang="hu-HU" dirty="0">
+                <a:latin typeface="Tahoma" panose="020B0604030504040204" pitchFamily="34" charset="0"/>
+                <a:ea typeface="Tahoma" panose="020B0604030504040204" pitchFamily="34" charset="0"/>
+                <a:cs typeface="Tahoma" panose="020B0604030504040204" pitchFamily="34" charset="0"/>
+              </a:rPr>
+              <a:t>Ügyfélszolgálat</a:t>
+            </a:r>
+          </a:p>
+          <a:p>
+            <a:endParaRPr lang="hu-HU" dirty="0"/>
+          </a:p>
+        </p:txBody>
+      </p:sp>
     </p:spTree>
     <p:extLst>
       <p:ext uri="{BB962C8B-B14F-4D97-AF65-F5344CB8AC3E}">
-        <p14:creationId xmlns:p14="http://schemas.microsoft.com/office/powerpoint/2010/main" val="3762249442"/>
+        <p14:creationId xmlns:p14="http://schemas.microsoft.com/office/powerpoint/2010/main" val="615629016"/>
       </p:ext>
     </p:extLst>
   </p:cSld>
@@ -4300,7 +4475,7 @@
           <p:cNvPr id="2" name="Title 1">
             <a:extLst>
               <a:ext uri="{FF2B5EF4-FFF2-40B4-BE49-F238E27FC236}">
-                <a16:creationId xmlns:a16="http://schemas.microsoft.com/office/drawing/2014/main" id="{4BA6A6C2-D8DA-B3F2-D191-C64F98DF3E3B}"/>
+                <a16:creationId xmlns:a16="http://schemas.microsoft.com/office/drawing/2014/main" id="{E9A1961F-B856-0EDA-C806-A7335AFF5F1C}"/>
               </a:ext>
             </a:extLst>
           </p:cNvPr>
@@ -4317,22 +4492,27 @@
           <a:lstStyle/>
           <a:p>
             <a:r>
-              <a:rPr lang="hu-HU" dirty="0">
+              <a:rPr lang="hu-HU">
                 <a:latin typeface="Tahoma" panose="020B0604030504040204" pitchFamily="34" charset="0"/>
                 <a:ea typeface="Tahoma" panose="020B0604030504040204" pitchFamily="34" charset="0"/>
                 <a:cs typeface="Tahoma" panose="020B0604030504040204" pitchFamily="34" charset="0"/>
               </a:rPr>
-              <a:t>A termékek</a:t>
-            </a:r>
+              <a:t>A főoldal</a:t>
+            </a:r>
+            <a:endParaRPr lang="hu-HU" dirty="0">
+              <a:latin typeface="Tahoma" panose="020B0604030504040204" pitchFamily="34" charset="0"/>
+              <a:ea typeface="Tahoma" panose="020B0604030504040204" pitchFamily="34" charset="0"/>
+              <a:cs typeface="Tahoma" panose="020B0604030504040204" pitchFamily="34" charset="0"/>
+            </a:endParaRPr>
           </a:p>
         </p:txBody>
       </p:sp>
       <p:pic>
         <p:nvPicPr>
-          <p:cNvPr id="9" name="Content Placeholder 8" descr="A screenshot of a product&#10;&#10;Description automatically generated">
-            <a:extLst>
-              <a:ext uri="{FF2B5EF4-FFF2-40B4-BE49-F238E27FC236}">
-                <a16:creationId xmlns:a16="http://schemas.microsoft.com/office/drawing/2014/main" id="{FB030305-C053-A691-5DF7-F5A8EAD10654}"/>
+          <p:cNvPr id="11" name="Content Placeholder 10" descr="A screenshot of a computer screen&#10;&#10;Description automatically generated">
+            <a:extLst>
+              <a:ext uri="{FF2B5EF4-FFF2-40B4-BE49-F238E27FC236}">
+                <a16:creationId xmlns:a16="http://schemas.microsoft.com/office/drawing/2014/main" id="{A470A64B-3D58-5626-5FA4-E3ABDA0E81C0}"/>
               </a:ext>
             </a:extLst>
           </p:cNvPr>
@@ -4357,74 +4537,15 @@
         </p:blipFill>
         <p:spPr>
           <a:xfrm>
-            <a:off x="2783391" y="2683580"/>
-            <a:ext cx="8732334" cy="3855333"/>
+            <a:off x="1630153" y="1825625"/>
+            <a:ext cx="8931693" cy="4351338"/>
           </a:xfrm>
         </p:spPr>
       </p:pic>
-      <p:sp>
-        <p:nvSpPr>
-          <p:cNvPr id="10" name="TextBox 9">
-            <a:extLst>
-              <a:ext uri="{FF2B5EF4-FFF2-40B4-BE49-F238E27FC236}">
-                <a16:creationId xmlns:a16="http://schemas.microsoft.com/office/drawing/2014/main" id="{78AB9524-CE2A-44A4-6182-71B244B32381}"/>
-              </a:ext>
-            </a:extLst>
-          </p:cNvPr>
-          <p:cNvSpPr txBox="1"/>
-          <p:nvPr/>
-        </p:nvSpPr>
-        <p:spPr>
-          <a:xfrm>
-            <a:off x="895350" y="1358017"/>
-            <a:ext cx="9563100" cy="1200329"/>
-          </a:xfrm>
-          <a:prstGeom prst="rect">
-            <a:avLst/>
-          </a:prstGeom>
-          <a:noFill/>
-        </p:spPr>
-        <p:txBody>
-          <a:bodyPr wrap="square" rtlCol="0">
-            <a:spAutoFit/>
-          </a:bodyPr>
-          <a:lstStyle/>
-          <a:p>
-            <a:r>
-              <a:rPr lang="hu-HU" sz="2400" dirty="0">
-                <a:latin typeface="Tahoma" panose="020B0604030504040204" pitchFamily="34" charset="0"/>
-                <a:ea typeface="Tahoma" panose="020B0604030504040204" pitchFamily="34" charset="0"/>
-                <a:cs typeface="Tahoma" panose="020B0604030504040204" pitchFamily="34" charset="0"/>
-              </a:rPr>
-              <a:t>Kommentek gyakori lekérése.</a:t>
-            </a:r>
-          </a:p>
-          <a:p>
-            <a:r>
-              <a:rPr lang="hu-HU" sz="2400" dirty="0">
-                <a:latin typeface="Tahoma" panose="020B0604030504040204" pitchFamily="34" charset="0"/>
-                <a:ea typeface="Tahoma" panose="020B0604030504040204" pitchFamily="34" charset="0"/>
-                <a:cs typeface="Tahoma" panose="020B0604030504040204" pitchFamily="34" charset="0"/>
-              </a:rPr>
-              <a:t>Felhasználó ellenörzése.</a:t>
-            </a:r>
-          </a:p>
-          <a:p>
-            <a:r>
-              <a:rPr lang="hu-HU" sz="2400" dirty="0">
-                <a:latin typeface="Tahoma" panose="020B0604030504040204" pitchFamily="34" charset="0"/>
-                <a:ea typeface="Tahoma" panose="020B0604030504040204" pitchFamily="34" charset="0"/>
-                <a:cs typeface="Tahoma" panose="020B0604030504040204" pitchFamily="34" charset="0"/>
-              </a:rPr>
-              <a:t>Termék értékelés átlag alapján.</a:t>
-            </a:r>
-          </a:p>
-        </p:txBody>
-      </p:sp>
     </p:spTree>
     <p:extLst>
       <p:ext uri="{BB962C8B-B14F-4D97-AF65-F5344CB8AC3E}">
-        <p14:creationId xmlns:p14="http://schemas.microsoft.com/office/powerpoint/2010/main" val="2601365507"/>
+        <p14:creationId xmlns:p14="http://schemas.microsoft.com/office/powerpoint/2010/main" val="3762249442"/>
       </p:ext>
     </p:extLst>
   </p:cSld>
@@ -4456,7 +4577,7 @@
           <p:cNvPr id="2" name="Title 1">
             <a:extLst>
               <a:ext uri="{FF2B5EF4-FFF2-40B4-BE49-F238E27FC236}">
-                <a16:creationId xmlns:a16="http://schemas.microsoft.com/office/drawing/2014/main" id="{9495A018-7061-F7D6-EF83-0CBE11C34E8A}"/>
+                <a16:creationId xmlns:a16="http://schemas.microsoft.com/office/drawing/2014/main" id="{4BA6A6C2-D8DA-B3F2-D191-C64F98DF3E3B}"/>
               </a:ext>
             </a:extLst>
           </p:cNvPr>
@@ -4478,74 +4599,17 @@
                 <a:ea typeface="Tahoma" panose="020B0604030504040204" pitchFamily="34" charset="0"/>
                 <a:cs typeface="Tahoma" panose="020B0604030504040204" pitchFamily="34" charset="0"/>
               </a:rPr>
-              <a:t>Regisztráció és Bejelentkezés</a:t>
-            </a:r>
-          </a:p>
-        </p:txBody>
-      </p:sp>
-      <p:sp>
-        <p:nvSpPr>
-          <p:cNvPr id="6" name="TextBox 5">
-            <a:extLst>
-              <a:ext uri="{FF2B5EF4-FFF2-40B4-BE49-F238E27FC236}">
-                <a16:creationId xmlns:a16="http://schemas.microsoft.com/office/drawing/2014/main" id="{AC7C4760-163E-59B4-7473-4242C39950E3}"/>
-              </a:ext>
-            </a:extLst>
-          </p:cNvPr>
-          <p:cNvSpPr txBox="1"/>
-          <p:nvPr/>
-        </p:nvSpPr>
-        <p:spPr>
-          <a:xfrm>
-            <a:off x="838200" y="1394483"/>
-            <a:ext cx="3848100" cy="1200329"/>
-          </a:xfrm>
-          <a:prstGeom prst="rect">
-            <a:avLst/>
-          </a:prstGeom>
-          <a:noFill/>
-        </p:spPr>
-        <p:txBody>
-          <a:bodyPr wrap="square" rtlCol="0">
-            <a:spAutoFit/>
-          </a:bodyPr>
-          <a:lstStyle/>
-          <a:p>
-            <a:pPr marL="342900" indent="-342900">
-              <a:buFont typeface="Arial" panose="020B0604020202020204" pitchFamily="34" charset="0"/>
-              <a:buChar char="•"/>
-            </a:pPr>
-            <a:r>
-              <a:rPr lang="hu-HU" sz="2400" dirty="0">
-                <a:latin typeface="Tahoma" panose="020B0604030504040204" pitchFamily="34" charset="0"/>
-                <a:ea typeface="Tahoma" panose="020B0604030504040204" pitchFamily="34" charset="0"/>
-                <a:cs typeface="Tahoma" panose="020B0604030504040204" pitchFamily="34" charset="0"/>
-              </a:rPr>
-              <a:t>React Toastify használata</a:t>
-            </a:r>
-          </a:p>
-          <a:p>
-            <a:pPr marL="342900" indent="-342900">
-              <a:buFont typeface="Arial" panose="020B0604020202020204" pitchFamily="34" charset="0"/>
-              <a:buChar char="•"/>
-            </a:pPr>
-            <a:r>
-              <a:rPr lang="hu-HU" sz="2400" dirty="0">
-                <a:latin typeface="Tahoma" panose="020B0604030504040204" pitchFamily="34" charset="0"/>
-                <a:ea typeface="Tahoma" panose="020B0604030504040204" pitchFamily="34" charset="0"/>
-                <a:cs typeface="Tahoma" panose="020B0604030504040204" pitchFamily="34" charset="0"/>
-              </a:rPr>
-              <a:t>Email alapú regisztráció</a:t>
+              <a:t>A termékek</a:t>
             </a:r>
           </a:p>
         </p:txBody>
       </p:sp>
       <p:pic>
         <p:nvPicPr>
-          <p:cNvPr id="12" name="Content Placeholder 11" descr="A screenshot of a computer&#10;&#10;Description automatically generated">
-            <a:extLst>
-              <a:ext uri="{FF2B5EF4-FFF2-40B4-BE49-F238E27FC236}">
-                <a16:creationId xmlns:a16="http://schemas.microsoft.com/office/drawing/2014/main" id="{131BF23A-FDFB-564F-03DD-EB6F7F4EB35C}"/>
+          <p:cNvPr id="9" name="Content Placeholder 8" descr="A screenshot of a product&#10;&#10;Description automatically generated">
+            <a:extLst>
+              <a:ext uri="{FF2B5EF4-FFF2-40B4-BE49-F238E27FC236}">
+                <a16:creationId xmlns:a16="http://schemas.microsoft.com/office/drawing/2014/main" id="{FB030305-C053-A691-5DF7-F5A8EAD10654}"/>
               </a:ext>
             </a:extLst>
           </p:cNvPr>
@@ -4570,15 +4634,74 @@
         </p:blipFill>
         <p:spPr>
           <a:xfrm>
-            <a:off x="838200" y="2720046"/>
-            <a:ext cx="10515600" cy="3760290"/>
+            <a:off x="3492112" y="1434636"/>
+            <a:ext cx="9041743" cy="3988727"/>
           </a:xfrm>
         </p:spPr>
       </p:pic>
+      <p:sp>
+        <p:nvSpPr>
+          <p:cNvPr id="10" name="TextBox 9">
+            <a:extLst>
+              <a:ext uri="{FF2B5EF4-FFF2-40B4-BE49-F238E27FC236}">
+                <a16:creationId xmlns:a16="http://schemas.microsoft.com/office/drawing/2014/main" id="{78AB9524-CE2A-44A4-6182-71B244B32381}"/>
+              </a:ext>
+            </a:extLst>
+          </p:cNvPr>
+          <p:cNvSpPr txBox="1"/>
+          <p:nvPr/>
+        </p:nvSpPr>
+        <p:spPr>
+          <a:xfrm>
+            <a:off x="838200" y="1690688"/>
+            <a:ext cx="3833966" cy="1938992"/>
+          </a:xfrm>
+          <a:prstGeom prst="rect">
+            <a:avLst/>
+          </a:prstGeom>
+          <a:noFill/>
+        </p:spPr>
+        <p:txBody>
+          <a:bodyPr wrap="square" rtlCol="0">
+            <a:spAutoFit/>
+          </a:bodyPr>
+          <a:lstStyle/>
+          <a:p>
+            <a:r>
+              <a:rPr lang="hu-HU" sz="2400" dirty="0">
+                <a:latin typeface="Tahoma" panose="020B0604030504040204" pitchFamily="34" charset="0"/>
+                <a:ea typeface="Tahoma" panose="020B0604030504040204" pitchFamily="34" charset="0"/>
+                <a:cs typeface="Tahoma" panose="020B0604030504040204" pitchFamily="34" charset="0"/>
+              </a:rPr>
+              <a:t>Kommentek gyakori lekérése.</a:t>
+            </a:r>
+          </a:p>
+          <a:p>
+            <a:r>
+              <a:rPr lang="hu-HU" sz="2400" dirty="0">
+                <a:latin typeface="Tahoma" panose="020B0604030504040204" pitchFamily="34" charset="0"/>
+                <a:ea typeface="Tahoma" panose="020B0604030504040204" pitchFamily="34" charset="0"/>
+                <a:cs typeface="Tahoma" panose="020B0604030504040204" pitchFamily="34" charset="0"/>
+              </a:rPr>
+              <a:t>Felhasználó ellenörzése.</a:t>
+            </a:r>
+          </a:p>
+          <a:p>
+            <a:r>
+              <a:rPr lang="hu-HU" sz="2400" dirty="0">
+                <a:latin typeface="Tahoma" panose="020B0604030504040204" pitchFamily="34" charset="0"/>
+                <a:ea typeface="Tahoma" panose="020B0604030504040204" pitchFamily="34" charset="0"/>
+                <a:cs typeface="Tahoma" panose="020B0604030504040204" pitchFamily="34" charset="0"/>
+              </a:rPr>
+              <a:t>Termék értékelés átlag alapján.</a:t>
+            </a:r>
+          </a:p>
+        </p:txBody>
+      </p:sp>
     </p:spTree>
     <p:extLst>
       <p:ext uri="{BB962C8B-B14F-4D97-AF65-F5344CB8AC3E}">
-        <p14:creationId xmlns:p14="http://schemas.microsoft.com/office/powerpoint/2010/main" val="3306523100"/>
+        <p14:creationId xmlns:p14="http://schemas.microsoft.com/office/powerpoint/2010/main" val="2601365507"/>
       </p:ext>
     </p:extLst>
   </p:cSld>
@@ -4610,7 +4733,7 @@
           <p:cNvPr id="2" name="Title 1">
             <a:extLst>
               <a:ext uri="{FF2B5EF4-FFF2-40B4-BE49-F238E27FC236}">
-                <a16:creationId xmlns:a16="http://schemas.microsoft.com/office/drawing/2014/main" id="{6319CF09-847A-A14D-EA63-6E6E5A02F614}"/>
+                <a16:creationId xmlns:a16="http://schemas.microsoft.com/office/drawing/2014/main" id="{9495A018-7061-F7D6-EF83-0CBE11C34E8A}"/>
               </a:ext>
             </a:extLst>
           </p:cNvPr>
@@ -4632,17 +4755,17 @@
                 <a:ea typeface="Tahoma" panose="020B0604030504040204" pitchFamily="34" charset="0"/>
                 <a:cs typeface="Tahoma" panose="020B0604030504040204" pitchFamily="34" charset="0"/>
               </a:rPr>
-              <a:t>Ügyfélszolgálat</a:t>
+              <a:t>Regisztráció és Bejelentkezés</a:t>
             </a:r>
           </a:p>
         </p:txBody>
       </p:sp>
       <p:pic>
         <p:nvPicPr>
-          <p:cNvPr id="5" name="Content Placeholder 4">
-            <a:extLst>
-              <a:ext uri="{FF2B5EF4-FFF2-40B4-BE49-F238E27FC236}">
-                <a16:creationId xmlns:a16="http://schemas.microsoft.com/office/drawing/2014/main" id="{5DBD54B3-F763-B82D-4E4F-79346B2338FB}"/>
+          <p:cNvPr id="12" name="Content Placeholder 11" descr="A screenshot of a computer&#10;&#10;Description automatically generated">
+            <a:extLst>
+              <a:ext uri="{FF2B5EF4-FFF2-40B4-BE49-F238E27FC236}">
+                <a16:creationId xmlns:a16="http://schemas.microsoft.com/office/drawing/2014/main" id="{131BF23A-FDFB-564F-03DD-EB6F7F4EB35C}"/>
               </a:ext>
             </a:extLst>
           </p:cNvPr>
@@ -4667,8 +4790,8 @@
         </p:blipFill>
         <p:spPr>
           <a:xfrm>
-            <a:off x="6185333" y="1684386"/>
-            <a:ext cx="4687160" cy="4110800"/>
+            <a:off x="838200" y="2594812"/>
+            <a:ext cx="10515600" cy="3760290"/>
           </a:xfrm>
         </p:spPr>
       </p:pic>
@@ -4677,7 +4800,7 @@
           <p:cNvPr id="6" name="TextBox 5">
             <a:extLst>
               <a:ext uri="{FF2B5EF4-FFF2-40B4-BE49-F238E27FC236}">
-                <a16:creationId xmlns:a16="http://schemas.microsoft.com/office/drawing/2014/main" id="{42B34F92-22F9-77F6-63EF-C536AD64D715}"/>
+                <a16:creationId xmlns:a16="http://schemas.microsoft.com/office/drawing/2014/main" id="{AC7C4760-163E-59B4-7473-4242C39950E3}"/>
               </a:ext>
             </a:extLst>
           </p:cNvPr>
@@ -4686,8 +4809,8 @@
         </p:nvSpPr>
         <p:spPr>
           <a:xfrm>
-            <a:off x="838200" y="1989056"/>
-            <a:ext cx="5006419" cy="1200329"/>
+            <a:off x="838200" y="1394483"/>
+            <a:ext cx="3848100" cy="1200329"/>
           </a:xfrm>
           <a:prstGeom prst="rect">
             <a:avLst/>
@@ -4710,7 +4833,7 @@
                 <a:ea typeface="Tahoma" panose="020B0604030504040204" pitchFamily="34" charset="0"/>
                 <a:cs typeface="Tahoma" panose="020B0604030504040204" pitchFamily="34" charset="0"/>
               </a:rPr>
-              <a:t>Modosított DialoGpt</a:t>
+              <a:t>React Toastify használata</a:t>
             </a:r>
           </a:p>
           <a:p>
@@ -4724,7 +4847,7 @@
                 <a:ea typeface="Tahoma" panose="020B0604030504040204" pitchFamily="34" charset="0"/>
                 <a:cs typeface="Tahoma" panose="020B0604030504040204" pitchFamily="34" charset="0"/>
               </a:rPr>
-              <a:t>Email, adatok lekérése, alap kommunikáció fenntartása</a:t>
+              <a:t>Email alapú regisztráció</a:t>
             </a:r>
           </a:p>
         </p:txBody>
@@ -4732,7 +4855,7 @@
     </p:spTree>
     <p:extLst>
       <p:ext uri="{BB962C8B-B14F-4D97-AF65-F5344CB8AC3E}">
-        <p14:creationId xmlns:p14="http://schemas.microsoft.com/office/powerpoint/2010/main" val="326475444"/>
+        <p14:creationId xmlns:p14="http://schemas.microsoft.com/office/powerpoint/2010/main" val="3306523100"/>
       </p:ext>
     </p:extLst>
   </p:cSld>
@@ -4764,7 +4887,7 @@
           <p:cNvPr id="2" name="Title 1">
             <a:extLst>
               <a:ext uri="{FF2B5EF4-FFF2-40B4-BE49-F238E27FC236}">
-                <a16:creationId xmlns:a16="http://schemas.microsoft.com/office/drawing/2014/main" id="{CA0B8ACB-63A9-C6AF-296B-934D6BF33BCE}"/>
+                <a16:creationId xmlns:a16="http://schemas.microsoft.com/office/drawing/2014/main" id="{6319CF09-847A-A14D-EA63-6E6E5A02F614}"/>
               </a:ext>
             </a:extLst>
           </p:cNvPr>
@@ -4786,7 +4909,7 @@
                 <a:ea typeface="Tahoma" panose="020B0604030504040204" pitchFamily="34" charset="0"/>
                 <a:cs typeface="Tahoma" panose="020B0604030504040204" pitchFamily="34" charset="0"/>
               </a:rPr>
-              <a:t>Rendelés esetén</a:t>
+              <a:t>Ügyfélszolgálat</a:t>
             </a:r>
           </a:p>
         </p:txBody>
@@ -4796,7 +4919,7 @@
           <p:cNvPr id="5" name="Content Placeholder 4">
             <a:extLst>
               <a:ext uri="{FF2B5EF4-FFF2-40B4-BE49-F238E27FC236}">
-                <a16:creationId xmlns:a16="http://schemas.microsoft.com/office/drawing/2014/main" id="{666FED20-9AEA-1987-25BD-3FD42286936A}"/>
+                <a16:creationId xmlns:a16="http://schemas.microsoft.com/office/drawing/2014/main" id="{5DBD54B3-F763-B82D-4E4F-79346B2338FB}"/>
               </a:ext>
             </a:extLst>
           </p:cNvPr>
@@ -4821,104 +4944,78 @@
         </p:blipFill>
         <p:spPr>
           <a:xfrm>
-            <a:off x="1285298" y="1766102"/>
-            <a:ext cx="9621404" cy="4351338"/>
+            <a:off x="6185333" y="1684386"/>
+            <a:ext cx="4687160" cy="4110800"/>
           </a:xfrm>
         </p:spPr>
       </p:pic>
+      <p:sp>
+        <p:nvSpPr>
+          <p:cNvPr id="6" name="TextBox 5">
+            <a:extLst>
+              <a:ext uri="{FF2B5EF4-FFF2-40B4-BE49-F238E27FC236}">
+                <a16:creationId xmlns:a16="http://schemas.microsoft.com/office/drawing/2014/main" id="{42B34F92-22F9-77F6-63EF-C536AD64D715}"/>
+              </a:ext>
+            </a:extLst>
+          </p:cNvPr>
+          <p:cNvSpPr txBox="1"/>
+          <p:nvPr/>
+        </p:nvSpPr>
+        <p:spPr>
+          <a:xfrm>
+            <a:off x="838200" y="1989056"/>
+            <a:ext cx="5006419" cy="1200329"/>
+          </a:xfrm>
+          <a:prstGeom prst="rect">
+            <a:avLst/>
+          </a:prstGeom>
+          <a:noFill/>
+        </p:spPr>
+        <p:txBody>
+          <a:bodyPr wrap="square" rtlCol="0">
+            <a:spAutoFit/>
+          </a:bodyPr>
+          <a:lstStyle/>
+          <a:p>
+            <a:pPr marL="342900" indent="-342900">
+              <a:buFont typeface="Arial" panose="020B0604020202020204" pitchFamily="34" charset="0"/>
+              <a:buChar char="•"/>
+            </a:pPr>
+            <a:r>
+              <a:rPr lang="hu-HU" sz="2400" dirty="0">
+                <a:latin typeface="Tahoma" panose="020B0604030504040204" pitchFamily="34" charset="0"/>
+                <a:ea typeface="Tahoma" panose="020B0604030504040204" pitchFamily="34" charset="0"/>
+                <a:cs typeface="Tahoma" panose="020B0604030504040204" pitchFamily="34" charset="0"/>
+              </a:rPr>
+              <a:t>Modosított DialoGpt</a:t>
+            </a:r>
+          </a:p>
+          <a:p>
+            <a:pPr marL="342900" indent="-342900">
+              <a:buFont typeface="Arial" panose="020B0604020202020204" pitchFamily="34" charset="0"/>
+              <a:buChar char="•"/>
+            </a:pPr>
+            <a:r>
+              <a:rPr lang="hu-HU" sz="2400" dirty="0">
+                <a:latin typeface="Tahoma" panose="020B0604030504040204" pitchFamily="34" charset="0"/>
+                <a:ea typeface="Tahoma" panose="020B0604030504040204" pitchFamily="34" charset="0"/>
+                <a:cs typeface="Tahoma" panose="020B0604030504040204" pitchFamily="34" charset="0"/>
+              </a:rPr>
+              <a:t>Email, adatok lekérése, alap kommunikáció fenntartása</a:t>
+            </a:r>
+          </a:p>
+        </p:txBody>
+      </p:sp>
     </p:spTree>
     <p:extLst>
       <p:ext uri="{BB962C8B-B14F-4D97-AF65-F5344CB8AC3E}">
-        <p14:creationId xmlns:p14="http://schemas.microsoft.com/office/powerpoint/2010/main" val="2568163165"/>
+        <p14:creationId xmlns:p14="http://schemas.microsoft.com/office/powerpoint/2010/main" val="326475444"/>
       </p:ext>
     </p:extLst>
   </p:cSld>
   <p:clrMapOvr>
     <a:masterClrMapping/>
   </p:clrMapOvr>
-  <p:timing>
-    <p:tnLst>
-      <p:par>
-        <p:cTn id="1" dur="indefinite" restart="never" nodeType="tmRoot">
-          <p:childTnLst>
-            <p:seq concurrent="1" nextAc="seek">
-              <p:cTn id="2" dur="indefinite" nodeType="mainSeq">
-                <p:childTnLst>
-                  <p:par>
-                    <p:cTn id="3" fill="hold">
-                      <p:stCondLst>
-                        <p:cond delay="indefinite"/>
-                      </p:stCondLst>
-                      <p:childTnLst>
-                        <p:par>
-                          <p:cTn id="4" fill="hold">
-                            <p:stCondLst>
-                              <p:cond delay="0"/>
-                            </p:stCondLst>
-                            <p:childTnLst>
-                              <p:par>
-                                <p:cTn id="5" presetID="10" presetClass="entr" presetSubtype="0" fill="hold" nodeType="clickEffect">
-                                  <p:stCondLst>
-                                    <p:cond delay="500"/>
-                                  </p:stCondLst>
-                                  <p:childTnLst>
-                                    <p:set>
-                                      <p:cBhvr>
-                                        <p:cTn id="6" dur="1" fill="hold">
-                                          <p:stCondLst>
-                                            <p:cond delay="0"/>
-                                          </p:stCondLst>
-                                        </p:cTn>
-                                        <p:tgtEl>
-                                          <p:spTgt spid="5"/>
-                                        </p:tgtEl>
-                                        <p:attrNameLst>
-                                          <p:attrName>style.visibility</p:attrName>
-                                        </p:attrNameLst>
-                                      </p:cBhvr>
-                                      <p:to>
-                                        <p:strVal val="visible"/>
-                                      </p:to>
-                                    </p:set>
-                                    <p:animEffect transition="in" filter="fade">
-                                      <p:cBhvr>
-                                        <p:cTn id="7" dur="2000"/>
-                                        <p:tgtEl>
-                                          <p:spTgt spid="5"/>
-                                        </p:tgtEl>
-                                      </p:cBhvr>
-                                    </p:animEffect>
-                                  </p:childTnLst>
-                                </p:cTn>
-                              </p:par>
-                            </p:childTnLst>
-                          </p:cTn>
-                        </p:par>
-                      </p:childTnLst>
-                    </p:cTn>
-                  </p:par>
-                </p:childTnLst>
-              </p:cTn>
-              <p:prevCondLst>
-                <p:cond evt="onPrev" delay="0">
-                  <p:tgtEl>
-                    <p:sldTgt/>
-                  </p:tgtEl>
-                </p:cond>
-              </p:prevCondLst>
-              <p:nextCondLst>
-                <p:cond evt="onNext" delay="0">
-                  <p:tgtEl>
-                    <p:sldTgt/>
-                  </p:tgtEl>
-                </p:cond>
-              </p:nextCondLst>
-            </p:seq>
-          </p:childTnLst>
-        </p:cTn>
-      </p:par>
-    </p:tnLst>
-  </p:timing>
 </p:sld>
 </file>
 
@@ -4944,7 +5041,7 @@
           <p:cNvPr id="2" name="Title 1">
             <a:extLst>
               <a:ext uri="{FF2B5EF4-FFF2-40B4-BE49-F238E27FC236}">
-                <a16:creationId xmlns:a16="http://schemas.microsoft.com/office/drawing/2014/main" id="{23583795-A5EC-C91A-111D-B29BFD4D56F9}"/>
+                <a16:creationId xmlns:a16="http://schemas.microsoft.com/office/drawing/2014/main" id="{CA0B8ACB-63A9-C6AF-296B-934D6BF33BCE}"/>
               </a:ext>
             </a:extLst>
           </p:cNvPr>
@@ -4960,23 +5057,32 @@
           <a:bodyPr/>
           <a:lstStyle/>
           <a:p>
-            <a:endParaRPr lang="hu-HU"/>
+            <a:r>
+              <a:rPr lang="hu-HU" dirty="0">
+                <a:latin typeface="Tahoma" panose="020B0604030504040204" pitchFamily="34" charset="0"/>
+                <a:ea typeface="Tahoma" panose="020B0604030504040204" pitchFamily="34" charset="0"/>
+                <a:cs typeface="Tahoma" panose="020B0604030504040204" pitchFamily="34" charset="0"/>
+              </a:rPr>
+              <a:t>Rendelés esetén</a:t>
+            </a:r>
           </a:p>
         </p:txBody>
       </p:sp>
       <p:pic>
         <p:nvPicPr>
-          <p:cNvPr id="9" name="Picture 8">
-            <a:extLst>
-              <a:ext uri="{FF2B5EF4-FFF2-40B4-BE49-F238E27FC236}">
-                <a16:creationId xmlns:a16="http://schemas.microsoft.com/office/drawing/2014/main" id="{FA3F7824-1CA2-AFD6-A5F6-F3EFF09012B1}"/>
+          <p:cNvPr id="5" name="Content Placeholder 4">
+            <a:extLst>
+              <a:ext uri="{FF2B5EF4-FFF2-40B4-BE49-F238E27FC236}">
+                <a16:creationId xmlns:a16="http://schemas.microsoft.com/office/drawing/2014/main" id="{666FED20-9AEA-1987-25BD-3FD42286936A}"/>
               </a:ext>
             </a:extLst>
           </p:cNvPr>
           <p:cNvPicPr>
-            <a:picLocks noChangeAspect="1"/>
+            <a:picLocks noGrp="1" noChangeAspect="1"/>
           </p:cNvPicPr>
-          <p:nvPr/>
+          <p:nvPr>
+            <p:ph idx="1"/>
+          </p:nvPr>
         </p:nvPicPr>
         <p:blipFill>
           <a:blip r:embed="rId2">
@@ -4992,53 +5098,15 @@
         </p:blipFill>
         <p:spPr>
           <a:xfrm>
-            <a:off x="7624506" y="2520300"/>
-            <a:ext cx="4567494" cy="3353121"/>
-          </a:xfrm>
-          <a:prstGeom prst="rect">
-            <a:avLst/>
-          </a:prstGeom>
-        </p:spPr>
-      </p:pic>
-      <p:pic>
-        <p:nvPicPr>
-          <p:cNvPr id="13" name="Content Placeholder 12">
-            <a:extLst>
-              <a:ext uri="{FF2B5EF4-FFF2-40B4-BE49-F238E27FC236}">
-                <a16:creationId xmlns:a16="http://schemas.microsoft.com/office/drawing/2014/main" id="{C9675842-F2A8-1C83-2A65-FD7A2A85784F}"/>
-              </a:ext>
-            </a:extLst>
-          </p:cNvPr>
-          <p:cNvPicPr>
-            <a:picLocks noGrp="1" noChangeAspect="1"/>
-          </p:cNvPicPr>
-          <p:nvPr>
-            <p:ph idx="1"/>
-          </p:nvPr>
-        </p:nvPicPr>
-        <p:blipFill>
-          <a:blip r:embed="rId3">
-            <a:extLst>
-              <a:ext uri="{28A0092B-C50C-407E-A947-70E740481C1C}">
-                <a14:useLocalDpi xmlns:a14="http://schemas.microsoft.com/office/drawing/2010/main" val="0"/>
-              </a:ext>
-            </a:extLst>
-          </a:blip>
-          <a:stretch>
-            <a:fillRect/>
-          </a:stretch>
-        </p:blipFill>
-        <p:spPr>
-          <a:xfrm>
-            <a:off x="157816" y="2668409"/>
-            <a:ext cx="7466690" cy="3353121"/>
+            <a:off x="1285298" y="1825625"/>
+            <a:ext cx="9621404" cy="4351338"/>
           </a:xfrm>
         </p:spPr>
       </p:pic>
     </p:spTree>
     <p:extLst>
       <p:ext uri="{BB962C8B-B14F-4D97-AF65-F5344CB8AC3E}">
-        <p14:creationId xmlns:p14="http://schemas.microsoft.com/office/powerpoint/2010/main" val="3405700671"/>
+        <p14:creationId xmlns:p14="http://schemas.microsoft.com/office/powerpoint/2010/main" val="2568163165"/>
       </p:ext>
     </p:extLst>
   </p:cSld>
@@ -5059,39 +5127,39 @@
         <a:sysClr val="window" lastClr="FFFFFF"/>
       </a:lt1>
       <a:dk2>
-        <a:srgbClr val="44546A"/>
+        <a:srgbClr val="0E2841"/>
       </a:dk2>
       <a:lt2>
-        <a:srgbClr val="E7E6E6"/>
+        <a:srgbClr val="E8E8E8"/>
       </a:lt2>
       <a:accent1>
-        <a:srgbClr val="4472C4"/>
+        <a:srgbClr val="156082"/>
       </a:accent1>
       <a:accent2>
-        <a:srgbClr val="ED7D31"/>
+        <a:srgbClr val="E97132"/>
       </a:accent2>
       <a:accent3>
-        <a:srgbClr val="A5A5A5"/>
+        <a:srgbClr val="196B24"/>
       </a:accent3>
       <a:accent4>
-        <a:srgbClr val="FFC000"/>
+        <a:srgbClr val="0F9ED5"/>
       </a:accent4>
       <a:accent5>
-        <a:srgbClr val="5B9BD5"/>
+        <a:srgbClr val="A02B93"/>
       </a:accent5>
       <a:accent6>
-        <a:srgbClr val="70AD47"/>
+        <a:srgbClr val="4EA72E"/>
       </a:accent6>
       <a:hlink>
-        <a:srgbClr val="0563C1"/>
+        <a:srgbClr val="467886"/>
       </a:hlink>
       <a:folHlink>
-        <a:srgbClr val="954F72"/>
+        <a:srgbClr val="96607D"/>
       </a:folHlink>
     </a:clrScheme>
     <a:fontScheme name="Office">
       <a:majorFont>
-        <a:latin typeface="Calibri Light" panose="020F0302020204030204"/>
+        <a:latin typeface="Aptos Display" panose="02110004020202020204"/>
         <a:ea typeface=""/>
         <a:cs typeface=""/>
         <a:font script="Jpan" typeface="游ゴシック Light"/>
@@ -5143,7 +5211,7 @@
         <a:font script="Tfng" typeface="Ebrima"/>
       </a:majorFont>
       <a:minorFont>
-        <a:latin typeface="Calibri" panose="020F0502020204030204"/>
+        <a:latin typeface="Aptos" panose="02110004020202020204"/>
         <a:ea typeface=""/>
         <a:cs typeface=""/>
         <a:font script="Jpan" typeface="游ゴシック"/>
@@ -5254,13 +5322,6 @@
         </a:gradFill>
       </a:fillStyleLst>
       <a:lnStyleLst>
-        <a:ln w="6350" cap="flat" cmpd="sng" algn="ctr">
-          <a:solidFill>
-            <a:schemeClr val="phClr"/>
-          </a:solidFill>
-          <a:prstDash val="solid"/>
-          <a:miter lim="800000"/>
-        </a:ln>
         <a:ln w="12700" cap="flat" cmpd="sng" algn="ctr">
           <a:solidFill>
             <a:schemeClr val="phClr"/>
@@ -5269,6 +5330,13 @@
           <a:miter lim="800000"/>
         </a:ln>
         <a:ln w="19050" cap="flat" cmpd="sng" algn="ctr">
+          <a:solidFill>
+            <a:schemeClr val="phClr"/>
+          </a:solidFill>
+          <a:prstDash val="solid"/>
+          <a:miter lim="800000"/>
+        </a:ln>
+        <a:ln w="25400" cap="flat" cmpd="sng" algn="ctr">
           <a:solidFill>
             <a:schemeClr val="phClr"/>
           </a:solidFill>
@@ -5333,11 +5401,31 @@
       </a:bgFillStyleLst>
     </a:fmtScheme>
   </a:themeElements>
-  <a:objectDefaults/>
+  <a:objectDefaults>
+    <a:lnDef>
+      <a:spPr/>
+      <a:bodyPr/>
+      <a:lstStyle/>
+      <a:style>
+        <a:lnRef idx="2">
+          <a:schemeClr val="accent1"/>
+        </a:lnRef>
+        <a:fillRef idx="0">
+          <a:schemeClr val="accent1"/>
+        </a:fillRef>
+        <a:effectRef idx="1">
+          <a:schemeClr val="accent1"/>
+        </a:effectRef>
+        <a:fontRef idx="minor">
+          <a:schemeClr val="tx1"/>
+        </a:fontRef>
+      </a:style>
+    </a:lnDef>
+  </a:objectDefaults>
   <a:extraClrSchemeLst/>
   <a:extLst>
     <a:ext uri="{05A4C25C-085E-4340-85A3-A5531E510DB2}">
-      <thm15:themeFamily xmlns:thm15="http://schemas.microsoft.com/office/thememl/2012/main" name="Office Theme" id="{62F939B6-93AF-4DB8-9C6B-D6C7DFDC589F}" vid="{4A3C46E8-61CC-4603-A589-7422A47A8E4A}"/>
+      <thm15:themeFamily xmlns:thm15="http://schemas.microsoft.com/office/thememl/2012/main" name="Office Theme" id="{2E142A2C-CD16-42D6-873A-C26D2A0506FA}" vid="{1BDDFF52-6CD6-40A5-AB3C-68EB2F1E4D0A}"/>
     </a:ext>
   </a:extLst>
 </a:theme>

</xml_diff>